<commit_message>
CISC 848 Proposal - Bit of work before bed
</commit_message>
<xml_diff>
--- a/CISC870/Presentation/Church.pptx
+++ b/CISC870/Presentation/Church.pptx
@@ -7,7 +7,9 @@
   <p:sldIdLst>
     <p:sldId id="256" r:id="rId2"/>
     <p:sldId id="257" r:id="rId3"/>
-    <p:sldId id="259" r:id="rId4"/>
+    <p:sldId id="260" r:id="rId4"/>
+    <p:sldId id="259" r:id="rId5"/>
+    <p:sldId id="261" r:id="rId6"/>
   </p:sldIdLst>
   <p:sldSz cx="12192000" cy="6858000"/>
   <p:notesSz cx="6858000" cy="9144000"/>
@@ -112,6 +114,2638 @@
     </p:ext>
   </p:extLst>
 </p:presentation>
+</file>
+
+<file path=ppt/diagrams/colors1.xml><?xml version="1.0" encoding="utf-8"?>
+<dgm:colorsDef xmlns:dgm="http://schemas.openxmlformats.org/drawingml/2006/diagram" xmlns:a="http://schemas.openxmlformats.org/drawingml/2006/main" uniqueId="urn:microsoft.com/office/officeart/2005/8/colors/colorful2">
+  <dgm:title val=""/>
+  <dgm:desc val=""/>
+  <dgm:catLst>
+    <dgm:cat type="colorful" pri="10200"/>
+  </dgm:catLst>
+  <dgm:styleLbl name="node0">
+    <dgm:fillClrLst meth="repeat">
+      <a:schemeClr val="accent1"/>
+    </dgm:fillClrLst>
+    <dgm:linClrLst meth="repeat">
+      <a:schemeClr val="lt1"/>
+    </dgm:linClrLst>
+    <dgm:effectClrLst/>
+    <dgm:txLinClrLst/>
+    <dgm:txFillClrLst/>
+    <dgm:txEffectClrLst/>
+  </dgm:styleLbl>
+  <dgm:styleLbl name="node1">
+    <dgm:fillClrLst>
+      <a:schemeClr val="accent2"/>
+      <a:schemeClr val="accent3"/>
+    </dgm:fillClrLst>
+    <dgm:linClrLst meth="repeat">
+      <a:schemeClr val="lt1"/>
+    </dgm:linClrLst>
+    <dgm:effectClrLst/>
+    <dgm:txLinClrLst/>
+    <dgm:txFillClrLst/>
+    <dgm:txEffectClrLst/>
+  </dgm:styleLbl>
+  <dgm:styleLbl name="alignNode1">
+    <dgm:fillClrLst>
+      <a:schemeClr val="accent2"/>
+      <a:schemeClr val="accent3"/>
+    </dgm:fillClrLst>
+    <dgm:linClrLst>
+      <a:schemeClr val="accent2"/>
+      <a:schemeClr val="accent3"/>
+    </dgm:linClrLst>
+    <dgm:effectClrLst/>
+    <dgm:txLinClrLst/>
+    <dgm:txFillClrLst/>
+    <dgm:txEffectClrLst/>
+  </dgm:styleLbl>
+  <dgm:styleLbl name="lnNode1">
+    <dgm:fillClrLst>
+      <a:schemeClr val="accent2"/>
+      <a:schemeClr val="accent3"/>
+    </dgm:fillClrLst>
+    <dgm:linClrLst meth="repeat">
+      <a:schemeClr val="lt1"/>
+    </dgm:linClrLst>
+    <dgm:effectClrLst/>
+    <dgm:txLinClrLst/>
+    <dgm:txFillClrLst/>
+    <dgm:txEffectClrLst/>
+  </dgm:styleLbl>
+  <dgm:styleLbl name="vennNode1">
+    <dgm:fillClrLst>
+      <a:schemeClr val="accent2">
+        <a:alpha val="50000"/>
+      </a:schemeClr>
+      <a:schemeClr val="accent3">
+        <a:alpha val="50000"/>
+      </a:schemeClr>
+    </dgm:fillClrLst>
+    <dgm:linClrLst meth="repeat">
+      <a:schemeClr val="lt1"/>
+    </dgm:linClrLst>
+    <dgm:effectClrLst/>
+    <dgm:txLinClrLst/>
+    <dgm:txFillClrLst/>
+    <dgm:txEffectClrLst/>
+  </dgm:styleLbl>
+  <dgm:styleLbl name="node2">
+    <dgm:fillClrLst>
+      <a:schemeClr val="accent3"/>
+    </dgm:fillClrLst>
+    <dgm:linClrLst meth="repeat">
+      <a:schemeClr val="lt1"/>
+    </dgm:linClrLst>
+    <dgm:effectClrLst/>
+    <dgm:txLinClrLst/>
+    <dgm:txFillClrLst/>
+    <dgm:txEffectClrLst/>
+  </dgm:styleLbl>
+  <dgm:styleLbl name="node3">
+    <dgm:fillClrLst>
+      <a:schemeClr val="accent4"/>
+    </dgm:fillClrLst>
+    <dgm:linClrLst meth="repeat">
+      <a:schemeClr val="lt1"/>
+    </dgm:linClrLst>
+    <dgm:effectClrLst/>
+    <dgm:txLinClrLst/>
+    <dgm:txFillClrLst/>
+    <dgm:txEffectClrLst/>
+  </dgm:styleLbl>
+  <dgm:styleLbl name="node4">
+    <dgm:fillClrLst>
+      <a:schemeClr val="accent5"/>
+    </dgm:fillClrLst>
+    <dgm:linClrLst meth="repeat">
+      <a:schemeClr val="lt1"/>
+    </dgm:linClrLst>
+    <dgm:effectClrLst/>
+    <dgm:txLinClrLst/>
+    <dgm:txFillClrLst/>
+    <dgm:txEffectClrLst/>
+  </dgm:styleLbl>
+  <dgm:styleLbl name="fgImgPlace1">
+    <dgm:fillClrLst>
+      <a:schemeClr val="accent2">
+        <a:tint val="50000"/>
+      </a:schemeClr>
+      <a:schemeClr val="accent3">
+        <a:tint val="50000"/>
+      </a:schemeClr>
+    </dgm:fillClrLst>
+    <dgm:linClrLst meth="repeat">
+      <a:schemeClr val="lt1"/>
+    </dgm:linClrLst>
+    <dgm:effectClrLst/>
+    <dgm:txLinClrLst/>
+    <dgm:txFillClrLst meth="repeat">
+      <a:schemeClr val="lt1"/>
+    </dgm:txFillClrLst>
+    <dgm:txEffectClrLst/>
+  </dgm:styleLbl>
+  <dgm:styleLbl name="alignImgPlace1">
+    <dgm:fillClrLst>
+      <a:schemeClr val="accent2">
+        <a:tint val="50000"/>
+      </a:schemeClr>
+      <a:schemeClr val="accent3">
+        <a:tint val="20000"/>
+      </a:schemeClr>
+    </dgm:fillClrLst>
+    <dgm:linClrLst meth="repeat">
+      <a:schemeClr val="lt1"/>
+    </dgm:linClrLst>
+    <dgm:effectClrLst/>
+    <dgm:txLinClrLst/>
+    <dgm:txFillClrLst meth="repeat">
+      <a:schemeClr val="lt1"/>
+    </dgm:txFillClrLst>
+    <dgm:txEffectClrLst/>
+  </dgm:styleLbl>
+  <dgm:styleLbl name="bgImgPlace1">
+    <dgm:fillClrLst>
+      <a:schemeClr val="accent2">
+        <a:tint val="50000"/>
+      </a:schemeClr>
+      <a:schemeClr val="accent3">
+        <a:tint val="20000"/>
+      </a:schemeClr>
+    </dgm:fillClrLst>
+    <dgm:linClrLst meth="repeat">
+      <a:schemeClr val="lt1"/>
+    </dgm:linClrLst>
+    <dgm:effectClrLst/>
+    <dgm:txLinClrLst/>
+    <dgm:txFillClrLst meth="repeat">
+      <a:schemeClr val="lt1"/>
+    </dgm:txFillClrLst>
+    <dgm:txEffectClrLst/>
+  </dgm:styleLbl>
+  <dgm:styleLbl name="sibTrans2D1">
+    <dgm:fillClrLst>
+      <a:schemeClr val="accent2"/>
+      <a:schemeClr val="accent3"/>
+    </dgm:fillClrLst>
+    <dgm:linClrLst meth="repeat">
+      <a:schemeClr val="lt1"/>
+    </dgm:linClrLst>
+    <dgm:effectClrLst/>
+    <dgm:txLinClrLst/>
+    <dgm:txFillClrLst/>
+    <dgm:txEffectClrLst/>
+  </dgm:styleLbl>
+  <dgm:styleLbl name="fgSibTrans2D1">
+    <dgm:fillClrLst>
+      <a:schemeClr val="accent2"/>
+      <a:schemeClr val="accent3"/>
+    </dgm:fillClrLst>
+    <dgm:linClrLst meth="repeat">
+      <a:schemeClr val="lt1"/>
+    </dgm:linClrLst>
+    <dgm:effectClrLst/>
+    <dgm:txLinClrLst/>
+    <dgm:txFillClrLst meth="repeat">
+      <a:schemeClr val="lt1"/>
+    </dgm:txFillClrLst>
+    <dgm:txEffectClrLst/>
+  </dgm:styleLbl>
+  <dgm:styleLbl name="bgSibTrans2D1">
+    <dgm:fillClrLst>
+      <a:schemeClr val="accent2"/>
+      <a:schemeClr val="accent3"/>
+    </dgm:fillClrLst>
+    <dgm:linClrLst meth="repeat">
+      <a:schemeClr val="lt1"/>
+    </dgm:linClrLst>
+    <dgm:effectClrLst/>
+    <dgm:txLinClrLst/>
+    <dgm:txFillClrLst meth="repeat">
+      <a:schemeClr val="lt1"/>
+    </dgm:txFillClrLst>
+    <dgm:txEffectClrLst/>
+  </dgm:styleLbl>
+  <dgm:styleLbl name="sibTrans1D1">
+    <dgm:fillClrLst/>
+    <dgm:linClrLst>
+      <a:schemeClr val="accent2"/>
+      <a:schemeClr val="accent3"/>
+    </dgm:linClrLst>
+    <dgm:effectClrLst/>
+    <dgm:txLinClrLst/>
+    <dgm:txFillClrLst meth="repeat">
+      <a:schemeClr val="tx1"/>
+    </dgm:txFillClrLst>
+    <dgm:txEffectClrLst/>
+  </dgm:styleLbl>
+  <dgm:styleLbl name="callout">
+    <dgm:fillClrLst meth="repeat">
+      <a:schemeClr val="accent2"/>
+    </dgm:fillClrLst>
+    <dgm:linClrLst meth="repeat">
+      <a:schemeClr val="accent2">
+        <a:tint val="50000"/>
+      </a:schemeClr>
+    </dgm:linClrLst>
+    <dgm:effectClrLst/>
+    <dgm:txLinClrLst/>
+    <dgm:txFillClrLst meth="repeat">
+      <a:schemeClr val="tx1"/>
+    </dgm:txFillClrLst>
+    <dgm:txEffectClrLst/>
+  </dgm:styleLbl>
+  <dgm:styleLbl name="asst0">
+    <dgm:fillClrLst meth="repeat">
+      <a:schemeClr val="accent2"/>
+    </dgm:fillClrLst>
+    <dgm:linClrLst meth="repeat">
+      <a:schemeClr val="lt1">
+        <a:shade val="80000"/>
+      </a:schemeClr>
+    </dgm:linClrLst>
+    <dgm:effectClrLst/>
+    <dgm:txLinClrLst/>
+    <dgm:txFillClrLst/>
+    <dgm:txEffectClrLst/>
+  </dgm:styleLbl>
+  <dgm:styleLbl name="asst1">
+    <dgm:fillClrLst meth="repeat">
+      <a:schemeClr val="accent3"/>
+    </dgm:fillClrLst>
+    <dgm:linClrLst meth="repeat">
+      <a:schemeClr val="lt1">
+        <a:shade val="80000"/>
+      </a:schemeClr>
+    </dgm:linClrLst>
+    <dgm:effectClrLst/>
+    <dgm:txLinClrLst/>
+    <dgm:txFillClrLst/>
+    <dgm:txEffectClrLst/>
+  </dgm:styleLbl>
+  <dgm:styleLbl name="asst2">
+    <dgm:fillClrLst>
+      <a:schemeClr val="accent4"/>
+    </dgm:fillClrLst>
+    <dgm:linClrLst meth="repeat">
+      <a:schemeClr val="lt1"/>
+    </dgm:linClrLst>
+    <dgm:effectClrLst/>
+    <dgm:txLinClrLst/>
+    <dgm:txFillClrLst/>
+    <dgm:txEffectClrLst/>
+  </dgm:styleLbl>
+  <dgm:styleLbl name="asst3">
+    <dgm:fillClrLst>
+      <a:schemeClr val="accent5"/>
+    </dgm:fillClrLst>
+    <dgm:linClrLst meth="repeat">
+      <a:schemeClr val="lt1"/>
+    </dgm:linClrLst>
+    <dgm:effectClrLst/>
+    <dgm:txLinClrLst/>
+    <dgm:txFillClrLst/>
+    <dgm:txEffectClrLst/>
+  </dgm:styleLbl>
+  <dgm:styleLbl name="asst4">
+    <dgm:fillClrLst>
+      <a:schemeClr val="accent6"/>
+    </dgm:fillClrLst>
+    <dgm:linClrLst meth="repeat">
+      <a:schemeClr val="lt1"/>
+    </dgm:linClrLst>
+    <dgm:effectClrLst/>
+    <dgm:txLinClrLst/>
+    <dgm:txFillClrLst/>
+    <dgm:txEffectClrLst/>
+  </dgm:styleLbl>
+  <dgm:styleLbl name="parChTrans2D1">
+    <dgm:fillClrLst meth="repeat">
+      <a:schemeClr val="accent2"/>
+    </dgm:fillClrLst>
+    <dgm:linClrLst meth="repeat">
+      <a:schemeClr val="lt1"/>
+    </dgm:linClrLst>
+    <dgm:effectClrLst/>
+    <dgm:txLinClrLst/>
+    <dgm:txFillClrLst meth="repeat">
+      <a:schemeClr val="lt1"/>
+    </dgm:txFillClrLst>
+    <dgm:txEffectClrLst/>
+  </dgm:styleLbl>
+  <dgm:styleLbl name="parChTrans2D2">
+    <dgm:fillClrLst meth="repeat">
+      <a:schemeClr val="accent3"/>
+    </dgm:fillClrLst>
+    <dgm:linClrLst meth="repeat">
+      <a:schemeClr val="lt1"/>
+    </dgm:linClrLst>
+    <dgm:effectClrLst/>
+    <dgm:txLinClrLst/>
+    <dgm:txFillClrLst/>
+    <dgm:txEffectClrLst/>
+  </dgm:styleLbl>
+  <dgm:styleLbl name="parChTrans2D3">
+    <dgm:fillClrLst meth="repeat">
+      <a:schemeClr val="accent4"/>
+    </dgm:fillClrLst>
+    <dgm:linClrLst meth="repeat">
+      <a:schemeClr val="lt1"/>
+    </dgm:linClrLst>
+    <dgm:effectClrLst/>
+    <dgm:txLinClrLst/>
+    <dgm:txFillClrLst/>
+    <dgm:txEffectClrLst/>
+  </dgm:styleLbl>
+  <dgm:styleLbl name="parChTrans2D4">
+    <dgm:fillClrLst meth="repeat">
+      <a:schemeClr val="accent5"/>
+    </dgm:fillClrLst>
+    <dgm:linClrLst meth="repeat">
+      <a:schemeClr val="lt1"/>
+    </dgm:linClrLst>
+    <dgm:effectClrLst/>
+    <dgm:txLinClrLst/>
+    <dgm:txFillClrLst meth="repeat">
+      <a:schemeClr val="lt1"/>
+    </dgm:txFillClrLst>
+    <dgm:txEffectClrLst/>
+  </dgm:styleLbl>
+  <dgm:styleLbl name="parChTrans1D1">
+    <dgm:fillClrLst meth="repeat">
+      <a:schemeClr val="accent2"/>
+    </dgm:fillClrLst>
+    <dgm:linClrLst meth="repeat">
+      <a:schemeClr val="accent2"/>
+    </dgm:linClrLst>
+    <dgm:effectClrLst/>
+    <dgm:txLinClrLst/>
+    <dgm:txFillClrLst meth="repeat">
+      <a:schemeClr val="tx1"/>
+    </dgm:txFillClrLst>
+    <dgm:txEffectClrLst/>
+  </dgm:styleLbl>
+  <dgm:styleLbl name="parChTrans1D2">
+    <dgm:fillClrLst meth="repeat">
+      <a:schemeClr val="accent2">
+        <a:tint val="90000"/>
+      </a:schemeClr>
+    </dgm:fillClrLst>
+    <dgm:linClrLst meth="repeat">
+      <a:schemeClr val="accent3"/>
+    </dgm:linClrLst>
+    <dgm:effectClrLst/>
+    <dgm:txLinClrLst/>
+    <dgm:txFillClrLst meth="repeat">
+      <a:schemeClr val="tx1"/>
+    </dgm:txFillClrLst>
+    <dgm:txEffectClrLst/>
+  </dgm:styleLbl>
+  <dgm:styleLbl name="parChTrans1D3">
+    <dgm:fillClrLst meth="repeat">
+      <a:schemeClr val="accent2">
+        <a:tint val="70000"/>
+      </a:schemeClr>
+    </dgm:fillClrLst>
+    <dgm:linClrLst meth="repeat">
+      <a:schemeClr val="accent4"/>
+    </dgm:linClrLst>
+    <dgm:effectClrLst/>
+    <dgm:txLinClrLst/>
+    <dgm:txFillClrLst meth="repeat">
+      <a:schemeClr val="tx1"/>
+    </dgm:txFillClrLst>
+    <dgm:txEffectClrLst/>
+  </dgm:styleLbl>
+  <dgm:styleLbl name="parChTrans1D4">
+    <dgm:fillClrLst meth="repeat">
+      <a:schemeClr val="accent2">
+        <a:tint val="50000"/>
+      </a:schemeClr>
+    </dgm:fillClrLst>
+    <dgm:linClrLst meth="repeat">
+      <a:schemeClr val="accent5"/>
+    </dgm:linClrLst>
+    <dgm:effectClrLst/>
+    <dgm:txLinClrLst/>
+    <dgm:txFillClrLst meth="repeat">
+      <a:schemeClr val="tx1"/>
+    </dgm:txFillClrLst>
+    <dgm:txEffectClrLst/>
+  </dgm:styleLbl>
+  <dgm:styleLbl name="fgAcc1">
+    <dgm:fillClrLst meth="repeat">
+      <a:schemeClr val="lt1">
+        <a:alpha val="90000"/>
+      </a:schemeClr>
+    </dgm:fillClrLst>
+    <dgm:linClrLst>
+      <a:schemeClr val="accent2"/>
+      <a:schemeClr val="accent3"/>
+    </dgm:linClrLst>
+    <dgm:effectClrLst/>
+    <dgm:txLinClrLst/>
+    <dgm:txFillClrLst meth="repeat">
+      <a:schemeClr val="dk1"/>
+    </dgm:txFillClrLst>
+    <dgm:txEffectClrLst/>
+  </dgm:styleLbl>
+  <dgm:styleLbl name="conFgAcc1">
+    <dgm:fillClrLst meth="repeat">
+      <a:schemeClr val="lt1">
+        <a:alpha val="90000"/>
+      </a:schemeClr>
+    </dgm:fillClrLst>
+    <dgm:linClrLst>
+      <a:schemeClr val="accent2"/>
+      <a:schemeClr val="accent3"/>
+    </dgm:linClrLst>
+    <dgm:effectClrLst/>
+    <dgm:txLinClrLst/>
+    <dgm:txFillClrLst meth="repeat">
+      <a:schemeClr val="dk1"/>
+    </dgm:txFillClrLst>
+    <dgm:txEffectClrLst/>
+  </dgm:styleLbl>
+  <dgm:styleLbl name="alignAcc1">
+    <dgm:fillClrLst meth="repeat">
+      <a:schemeClr val="lt1">
+        <a:alpha val="90000"/>
+      </a:schemeClr>
+    </dgm:fillClrLst>
+    <dgm:linClrLst>
+      <a:schemeClr val="accent2"/>
+      <a:schemeClr val="accent3"/>
+    </dgm:linClrLst>
+    <dgm:effectClrLst/>
+    <dgm:txLinClrLst/>
+    <dgm:txFillClrLst meth="repeat">
+      <a:schemeClr val="dk1"/>
+    </dgm:txFillClrLst>
+    <dgm:txEffectClrLst/>
+  </dgm:styleLbl>
+  <dgm:styleLbl name="trAlignAcc1">
+    <dgm:fillClrLst meth="repeat">
+      <a:schemeClr val="lt1">
+        <a:alpha val="40000"/>
+      </a:schemeClr>
+    </dgm:fillClrLst>
+    <dgm:linClrLst meth="repeat">
+      <a:schemeClr val="accent2"/>
+    </dgm:linClrLst>
+    <dgm:effectClrLst/>
+    <dgm:txLinClrLst/>
+    <dgm:txFillClrLst meth="repeat">
+      <a:schemeClr val="dk1"/>
+    </dgm:txFillClrLst>
+    <dgm:txEffectClrLst/>
+  </dgm:styleLbl>
+  <dgm:styleLbl name="bgAcc1">
+    <dgm:fillClrLst meth="repeat">
+      <a:schemeClr val="lt1">
+        <a:alpha val="90000"/>
+      </a:schemeClr>
+    </dgm:fillClrLst>
+    <dgm:linClrLst>
+      <a:schemeClr val="accent2"/>
+      <a:schemeClr val="accent3"/>
+    </dgm:linClrLst>
+    <dgm:effectClrLst/>
+    <dgm:txLinClrLst/>
+    <dgm:txFillClrLst meth="repeat">
+      <a:schemeClr val="dk1"/>
+    </dgm:txFillClrLst>
+    <dgm:txEffectClrLst/>
+  </dgm:styleLbl>
+  <dgm:styleLbl name="solidFgAcc1">
+    <dgm:fillClrLst meth="repeat">
+      <a:schemeClr val="lt1"/>
+    </dgm:fillClrLst>
+    <dgm:linClrLst>
+      <a:schemeClr val="accent2"/>
+      <a:schemeClr val="accent3"/>
+    </dgm:linClrLst>
+    <dgm:effectClrLst/>
+    <dgm:txLinClrLst/>
+    <dgm:txFillClrLst meth="repeat">
+      <a:schemeClr val="dk1"/>
+    </dgm:txFillClrLst>
+    <dgm:txEffectClrLst/>
+  </dgm:styleLbl>
+  <dgm:styleLbl name="solidAlignAcc1">
+    <dgm:fillClrLst meth="repeat">
+      <a:schemeClr val="lt1"/>
+    </dgm:fillClrLst>
+    <dgm:linClrLst>
+      <a:schemeClr val="accent2"/>
+      <a:schemeClr val="accent3"/>
+    </dgm:linClrLst>
+    <dgm:effectClrLst/>
+    <dgm:txLinClrLst/>
+    <dgm:txFillClrLst meth="repeat">
+      <a:schemeClr val="dk1"/>
+    </dgm:txFillClrLst>
+    <dgm:txEffectClrLst/>
+  </dgm:styleLbl>
+  <dgm:styleLbl name="solidBgAcc1">
+    <dgm:fillClrLst meth="repeat">
+      <a:schemeClr val="lt1"/>
+    </dgm:fillClrLst>
+    <dgm:linClrLst>
+      <a:schemeClr val="accent2"/>
+      <a:schemeClr val="accent3"/>
+    </dgm:linClrLst>
+    <dgm:effectClrLst/>
+    <dgm:txLinClrLst/>
+    <dgm:txFillClrLst meth="repeat">
+      <a:schemeClr val="dk1"/>
+    </dgm:txFillClrLst>
+    <dgm:txEffectClrLst/>
+  </dgm:styleLbl>
+  <dgm:styleLbl name="fgAccFollowNode1">
+    <dgm:fillClrLst>
+      <a:schemeClr val="accent2">
+        <a:tint val="40000"/>
+        <a:alpha val="90000"/>
+      </a:schemeClr>
+      <a:schemeClr val="accent3">
+        <a:tint val="40000"/>
+        <a:alpha val="90000"/>
+      </a:schemeClr>
+    </dgm:fillClrLst>
+    <dgm:linClrLst>
+      <a:schemeClr val="accent2">
+        <a:tint val="40000"/>
+        <a:alpha val="90000"/>
+      </a:schemeClr>
+      <a:schemeClr val="accent3">
+        <a:tint val="40000"/>
+        <a:alpha val="90000"/>
+      </a:schemeClr>
+    </dgm:linClrLst>
+    <dgm:effectClrLst/>
+    <dgm:txLinClrLst/>
+    <dgm:txFillClrLst meth="repeat">
+      <a:schemeClr val="dk1"/>
+    </dgm:txFillClrLst>
+    <dgm:txEffectClrLst/>
+  </dgm:styleLbl>
+  <dgm:styleLbl name="alignAccFollowNode1">
+    <dgm:fillClrLst>
+      <a:schemeClr val="accent2">
+        <a:tint val="40000"/>
+        <a:alpha val="90000"/>
+      </a:schemeClr>
+      <a:schemeClr val="accent3">
+        <a:tint val="40000"/>
+        <a:alpha val="90000"/>
+      </a:schemeClr>
+    </dgm:fillClrLst>
+    <dgm:linClrLst>
+      <a:schemeClr val="accent2">
+        <a:tint val="40000"/>
+        <a:alpha val="90000"/>
+      </a:schemeClr>
+      <a:schemeClr val="accent3">
+        <a:tint val="40000"/>
+        <a:alpha val="90000"/>
+      </a:schemeClr>
+    </dgm:linClrLst>
+    <dgm:effectClrLst/>
+    <dgm:txLinClrLst/>
+    <dgm:txFillClrLst meth="repeat">
+      <a:schemeClr val="dk1"/>
+    </dgm:txFillClrLst>
+    <dgm:txEffectClrLst/>
+  </dgm:styleLbl>
+  <dgm:styleLbl name="bgAccFollowNode1">
+    <dgm:fillClrLst>
+      <a:schemeClr val="accent2">
+        <a:tint val="40000"/>
+        <a:alpha val="90000"/>
+      </a:schemeClr>
+      <a:schemeClr val="accent3">
+        <a:tint val="40000"/>
+        <a:alpha val="90000"/>
+      </a:schemeClr>
+    </dgm:fillClrLst>
+    <dgm:linClrLst>
+      <a:schemeClr val="accent2">
+        <a:tint val="40000"/>
+        <a:alpha val="90000"/>
+      </a:schemeClr>
+      <a:schemeClr val="accent3">
+        <a:tint val="40000"/>
+        <a:alpha val="90000"/>
+      </a:schemeClr>
+    </dgm:linClrLst>
+    <dgm:effectClrLst/>
+    <dgm:txLinClrLst/>
+    <dgm:txFillClrLst meth="repeat">
+      <a:schemeClr val="dk1"/>
+    </dgm:txFillClrLst>
+    <dgm:txEffectClrLst/>
+  </dgm:styleLbl>
+  <dgm:styleLbl name="fgAcc0">
+    <dgm:fillClrLst meth="repeat">
+      <a:schemeClr val="lt1">
+        <a:alpha val="90000"/>
+      </a:schemeClr>
+    </dgm:fillClrLst>
+    <dgm:linClrLst>
+      <a:schemeClr val="accent1"/>
+    </dgm:linClrLst>
+    <dgm:effectClrLst/>
+    <dgm:txLinClrLst/>
+    <dgm:txFillClrLst meth="repeat">
+      <a:schemeClr val="dk1"/>
+    </dgm:txFillClrLst>
+    <dgm:txEffectClrLst/>
+  </dgm:styleLbl>
+  <dgm:styleLbl name="fgAcc2">
+    <dgm:fillClrLst meth="repeat">
+      <a:schemeClr val="lt1">
+        <a:alpha val="90000"/>
+      </a:schemeClr>
+    </dgm:fillClrLst>
+    <dgm:linClrLst>
+      <a:schemeClr val="accent3"/>
+    </dgm:linClrLst>
+    <dgm:effectClrLst/>
+    <dgm:txLinClrLst/>
+    <dgm:txFillClrLst meth="repeat">
+      <a:schemeClr val="dk1"/>
+    </dgm:txFillClrLst>
+    <dgm:txEffectClrLst/>
+  </dgm:styleLbl>
+  <dgm:styleLbl name="fgAcc3">
+    <dgm:fillClrLst meth="repeat">
+      <a:schemeClr val="lt1">
+        <a:alpha val="90000"/>
+      </a:schemeClr>
+    </dgm:fillClrLst>
+    <dgm:linClrLst>
+      <a:schemeClr val="accent4"/>
+    </dgm:linClrLst>
+    <dgm:effectClrLst/>
+    <dgm:txLinClrLst/>
+    <dgm:txFillClrLst meth="repeat">
+      <a:schemeClr val="dk1"/>
+    </dgm:txFillClrLst>
+    <dgm:txEffectClrLst/>
+  </dgm:styleLbl>
+  <dgm:styleLbl name="fgAcc4">
+    <dgm:fillClrLst meth="repeat">
+      <a:schemeClr val="lt1">
+        <a:alpha val="90000"/>
+      </a:schemeClr>
+    </dgm:fillClrLst>
+    <dgm:linClrLst>
+      <a:schemeClr val="accent5"/>
+    </dgm:linClrLst>
+    <dgm:effectClrLst/>
+    <dgm:txLinClrLst/>
+    <dgm:txFillClrLst meth="repeat">
+      <a:schemeClr val="dk1"/>
+    </dgm:txFillClrLst>
+    <dgm:txEffectClrLst/>
+  </dgm:styleLbl>
+  <dgm:styleLbl name="bgShp">
+    <dgm:fillClrLst meth="repeat">
+      <a:schemeClr val="accent2">
+        <a:tint val="40000"/>
+      </a:schemeClr>
+    </dgm:fillClrLst>
+    <dgm:linClrLst meth="repeat">
+      <a:schemeClr val="dk1"/>
+    </dgm:linClrLst>
+    <dgm:effectClrLst/>
+    <dgm:txLinClrLst/>
+    <dgm:txFillClrLst meth="repeat">
+      <a:schemeClr val="dk1"/>
+    </dgm:txFillClrLst>
+    <dgm:txEffectClrLst/>
+  </dgm:styleLbl>
+  <dgm:styleLbl name="dkBgShp">
+    <dgm:fillClrLst meth="repeat">
+      <a:schemeClr val="accent2">
+        <a:shade val="90000"/>
+      </a:schemeClr>
+    </dgm:fillClrLst>
+    <dgm:linClrLst meth="repeat">
+      <a:schemeClr val="dk1"/>
+    </dgm:linClrLst>
+    <dgm:effectClrLst/>
+    <dgm:txLinClrLst/>
+    <dgm:txFillClrLst meth="repeat">
+      <a:schemeClr val="lt1"/>
+    </dgm:txFillClrLst>
+    <dgm:txEffectClrLst/>
+  </dgm:styleLbl>
+  <dgm:styleLbl name="trBgShp">
+    <dgm:fillClrLst meth="repeat">
+      <a:schemeClr val="accent2">
+        <a:tint val="50000"/>
+        <a:alpha val="40000"/>
+      </a:schemeClr>
+    </dgm:fillClrLst>
+    <dgm:linClrLst meth="repeat">
+      <a:schemeClr val="accent2"/>
+    </dgm:linClrLst>
+    <dgm:effectClrLst/>
+    <dgm:txLinClrLst/>
+    <dgm:txFillClrLst meth="repeat">
+      <a:schemeClr val="lt1"/>
+    </dgm:txFillClrLst>
+    <dgm:txEffectClrLst/>
+  </dgm:styleLbl>
+  <dgm:styleLbl name="fgShp">
+    <dgm:fillClrLst meth="repeat">
+      <a:schemeClr val="accent2">
+        <a:tint val="40000"/>
+      </a:schemeClr>
+    </dgm:fillClrLst>
+    <dgm:linClrLst meth="repeat">
+      <a:schemeClr val="lt1"/>
+    </dgm:linClrLst>
+    <dgm:effectClrLst/>
+    <dgm:txLinClrLst/>
+    <dgm:txFillClrLst meth="repeat">
+      <a:schemeClr val="dk1"/>
+    </dgm:txFillClrLst>
+    <dgm:txEffectClrLst/>
+  </dgm:styleLbl>
+  <dgm:styleLbl name="revTx">
+    <dgm:fillClrLst meth="repeat">
+      <a:schemeClr val="lt1">
+        <a:alpha val="0"/>
+      </a:schemeClr>
+    </dgm:fillClrLst>
+    <dgm:linClrLst meth="repeat">
+      <a:schemeClr val="dk1">
+        <a:alpha val="0"/>
+      </a:schemeClr>
+    </dgm:linClrLst>
+    <dgm:effectClrLst/>
+    <dgm:txLinClrLst/>
+    <dgm:txFillClrLst meth="repeat">
+      <a:schemeClr val="tx1"/>
+    </dgm:txFillClrLst>
+    <dgm:txEffectClrLst/>
+  </dgm:styleLbl>
+</dgm:colorsDef>
+</file>
+
+<file path=ppt/diagrams/data1.xml><?xml version="1.0" encoding="utf-8"?>
+<dgm:dataModel xmlns:dgm="http://schemas.openxmlformats.org/drawingml/2006/diagram" xmlns:a="http://schemas.openxmlformats.org/drawingml/2006/main">
+  <dgm:ptLst>
+    <dgm:pt modelId="{6A1D23BC-C3AC-4D99-8D12-DFED8DD025D4}" type="doc">
+      <dgm:prSet loTypeId="urn:microsoft.com/office/officeart/2005/8/layout/pyramid3" loCatId="pyramid" qsTypeId="urn:microsoft.com/office/officeart/2005/8/quickstyle/3d5" qsCatId="3D" csTypeId="urn:microsoft.com/office/officeart/2005/8/colors/colorful2" csCatId="colorful" phldr="1"/>
+      <dgm:spPr/>
+    </dgm:pt>
+    <dgm:pt modelId="{87811AA5-D1CD-40C7-B269-D3FF20BB3E92}">
+      <dgm:prSet phldrT="[Text]"/>
+      <dgm:spPr/>
+      <dgm:t>
+        <a:bodyPr/>
+        <a:lstStyle/>
+        <a:p>
+          <a:r>
+            <a:rPr lang="en-US" dirty="0" smtClean="0"/>
+            <a:t>Unknown, dynamic</a:t>
+          </a:r>
+          <a:endParaRPr lang="en-CA" dirty="0"/>
+        </a:p>
+      </dgm:t>
+    </dgm:pt>
+    <dgm:pt modelId="{2DF22CB7-DD99-4C96-B1A7-8353744C289C}" type="parTrans" cxnId="{59510446-F59E-42C0-868A-199BAC74E0D6}">
+      <dgm:prSet/>
+      <dgm:spPr/>
+      <dgm:t>
+        <a:bodyPr/>
+        <a:lstStyle/>
+        <a:p>
+          <a:endParaRPr lang="en-CA"/>
+        </a:p>
+      </dgm:t>
+    </dgm:pt>
+    <dgm:pt modelId="{E7B36415-D68E-40A6-9E63-0F61D00ACDCD}" type="sibTrans" cxnId="{59510446-F59E-42C0-868A-199BAC74E0D6}">
+      <dgm:prSet/>
+      <dgm:spPr/>
+      <dgm:t>
+        <a:bodyPr/>
+        <a:lstStyle/>
+        <a:p>
+          <a:endParaRPr lang="en-CA"/>
+        </a:p>
+      </dgm:t>
+    </dgm:pt>
+    <dgm:pt modelId="{77646417-596F-4F8D-A2D0-A681770B1924}">
+      <dgm:prSet phldrT="[Text]"/>
+      <dgm:spPr/>
+      <dgm:t>
+        <a:bodyPr/>
+        <a:lstStyle/>
+        <a:p>
+          <a:r>
+            <a:rPr lang="en-US" dirty="0" smtClean="0"/>
+            <a:t>Unknown, static</a:t>
+          </a:r>
+          <a:endParaRPr lang="en-CA" dirty="0"/>
+        </a:p>
+      </dgm:t>
+    </dgm:pt>
+    <dgm:pt modelId="{E9E98D10-219C-4CC5-9FBA-52B099C4BB04}" type="parTrans" cxnId="{8BC712F7-4CFF-41EB-9ED8-C2DA43ED59CA}">
+      <dgm:prSet/>
+      <dgm:spPr/>
+      <dgm:t>
+        <a:bodyPr/>
+        <a:lstStyle/>
+        <a:p>
+          <a:endParaRPr lang="en-CA"/>
+        </a:p>
+      </dgm:t>
+    </dgm:pt>
+    <dgm:pt modelId="{6B775264-79C0-4025-BA2D-9B3D2D699E40}" type="sibTrans" cxnId="{8BC712F7-4CFF-41EB-9ED8-C2DA43ED59CA}">
+      <dgm:prSet/>
+      <dgm:spPr/>
+      <dgm:t>
+        <a:bodyPr/>
+        <a:lstStyle/>
+        <a:p>
+          <a:endParaRPr lang="en-CA"/>
+        </a:p>
+      </dgm:t>
+    </dgm:pt>
+    <dgm:pt modelId="{FF855A13-0D9A-482F-9C6F-F5A9F8FABF61}">
+      <dgm:prSet phldrT="[Text]"/>
+      <dgm:spPr/>
+      <dgm:t>
+        <a:bodyPr/>
+        <a:lstStyle/>
+        <a:p>
+          <a:r>
+            <a:rPr lang="en-US" dirty="0" smtClean="0"/>
+            <a:t>Known</a:t>
+          </a:r>
+          <a:endParaRPr lang="en-CA" dirty="0"/>
+        </a:p>
+      </dgm:t>
+    </dgm:pt>
+    <dgm:pt modelId="{3299224D-5A4C-468C-8D79-A70B0E3827B4}" type="parTrans" cxnId="{64A059E7-2E03-4735-9F31-438671FCC54E}">
+      <dgm:prSet/>
+      <dgm:spPr/>
+      <dgm:t>
+        <a:bodyPr/>
+        <a:lstStyle/>
+        <a:p>
+          <a:endParaRPr lang="en-CA"/>
+        </a:p>
+      </dgm:t>
+    </dgm:pt>
+    <dgm:pt modelId="{721B1A3D-6D3E-4EE9-853A-315384A4992A}" type="sibTrans" cxnId="{64A059E7-2E03-4735-9F31-438671FCC54E}">
+      <dgm:prSet/>
+      <dgm:spPr/>
+      <dgm:t>
+        <a:bodyPr/>
+        <a:lstStyle/>
+        <a:p>
+          <a:endParaRPr lang="en-CA"/>
+        </a:p>
+      </dgm:t>
+    </dgm:pt>
+    <dgm:pt modelId="{59C1A9F1-0284-49D6-AC06-A0A84159DD89}" type="pres">
+      <dgm:prSet presAssocID="{6A1D23BC-C3AC-4D99-8D12-DFED8DD025D4}" presName="Name0" presStyleCnt="0">
+        <dgm:presLayoutVars>
+          <dgm:dir/>
+          <dgm:animLvl val="lvl"/>
+          <dgm:resizeHandles val="exact"/>
+        </dgm:presLayoutVars>
+      </dgm:prSet>
+      <dgm:spPr/>
+    </dgm:pt>
+    <dgm:pt modelId="{4B398DB7-7FFE-4D34-9427-F739742E49C4}" type="pres">
+      <dgm:prSet presAssocID="{87811AA5-D1CD-40C7-B269-D3FF20BB3E92}" presName="Name8" presStyleCnt="0"/>
+      <dgm:spPr/>
+    </dgm:pt>
+    <dgm:pt modelId="{720B97A8-FCAB-4143-99C3-9E84F78E0DFF}" type="pres">
+      <dgm:prSet presAssocID="{87811AA5-D1CD-40C7-B269-D3FF20BB3E92}" presName="level" presStyleLbl="node1" presStyleIdx="0" presStyleCnt="3">
+        <dgm:presLayoutVars>
+          <dgm:chMax val="1"/>
+          <dgm:bulletEnabled val="1"/>
+        </dgm:presLayoutVars>
+      </dgm:prSet>
+      <dgm:spPr/>
+    </dgm:pt>
+    <dgm:pt modelId="{283EE8C8-FD28-4788-8E71-C9009793EE4F}" type="pres">
+      <dgm:prSet presAssocID="{87811AA5-D1CD-40C7-B269-D3FF20BB3E92}" presName="levelTx" presStyleLbl="revTx" presStyleIdx="0" presStyleCnt="0">
+        <dgm:presLayoutVars>
+          <dgm:chMax val="1"/>
+          <dgm:bulletEnabled val="1"/>
+        </dgm:presLayoutVars>
+      </dgm:prSet>
+      <dgm:spPr/>
+    </dgm:pt>
+    <dgm:pt modelId="{3CC0C807-3865-4D64-B78E-EFFCC5EBA5FD}" type="pres">
+      <dgm:prSet presAssocID="{77646417-596F-4F8D-A2D0-A681770B1924}" presName="Name8" presStyleCnt="0"/>
+      <dgm:spPr/>
+    </dgm:pt>
+    <dgm:pt modelId="{AA1E9AC3-1FEE-4522-A0D1-48C3B029E26D}" type="pres">
+      <dgm:prSet presAssocID="{77646417-596F-4F8D-A2D0-A681770B1924}" presName="level" presStyleLbl="node1" presStyleIdx="1" presStyleCnt="3">
+        <dgm:presLayoutVars>
+          <dgm:chMax val="1"/>
+          <dgm:bulletEnabled val="1"/>
+        </dgm:presLayoutVars>
+      </dgm:prSet>
+      <dgm:spPr/>
+      <dgm:t>
+        <a:bodyPr/>
+        <a:lstStyle/>
+        <a:p>
+          <a:endParaRPr lang="en-CA"/>
+        </a:p>
+      </dgm:t>
+    </dgm:pt>
+    <dgm:pt modelId="{B17DE064-8EC9-47BC-A16D-A448C7800284}" type="pres">
+      <dgm:prSet presAssocID="{77646417-596F-4F8D-A2D0-A681770B1924}" presName="levelTx" presStyleLbl="revTx" presStyleIdx="0" presStyleCnt="0">
+        <dgm:presLayoutVars>
+          <dgm:chMax val="1"/>
+          <dgm:bulletEnabled val="1"/>
+        </dgm:presLayoutVars>
+      </dgm:prSet>
+      <dgm:spPr/>
+      <dgm:t>
+        <a:bodyPr/>
+        <a:lstStyle/>
+        <a:p>
+          <a:endParaRPr lang="en-CA"/>
+        </a:p>
+      </dgm:t>
+    </dgm:pt>
+    <dgm:pt modelId="{E8CEBB27-6B22-40F5-BAC7-E407163FCE28}" type="pres">
+      <dgm:prSet presAssocID="{FF855A13-0D9A-482F-9C6F-F5A9F8FABF61}" presName="Name8" presStyleCnt="0"/>
+      <dgm:spPr/>
+    </dgm:pt>
+    <dgm:pt modelId="{E35640F2-9DB8-4179-A943-13C60EF5B5F4}" type="pres">
+      <dgm:prSet presAssocID="{FF855A13-0D9A-482F-9C6F-F5A9F8FABF61}" presName="level" presStyleLbl="node1" presStyleIdx="2" presStyleCnt="3">
+        <dgm:presLayoutVars>
+          <dgm:chMax val="1"/>
+          <dgm:bulletEnabled val="1"/>
+        </dgm:presLayoutVars>
+      </dgm:prSet>
+      <dgm:spPr/>
+    </dgm:pt>
+    <dgm:pt modelId="{1118D280-9087-4A64-A8DF-C165308F95FC}" type="pres">
+      <dgm:prSet presAssocID="{FF855A13-0D9A-482F-9C6F-F5A9F8FABF61}" presName="levelTx" presStyleLbl="revTx" presStyleIdx="0" presStyleCnt="0">
+        <dgm:presLayoutVars>
+          <dgm:chMax val="1"/>
+          <dgm:bulletEnabled val="1"/>
+        </dgm:presLayoutVars>
+      </dgm:prSet>
+      <dgm:spPr/>
+    </dgm:pt>
+  </dgm:ptLst>
+  <dgm:cxnLst>
+    <dgm:cxn modelId="{08501E6C-9F77-46F0-B466-B084BD70FCDC}" type="presOf" srcId="{FF855A13-0D9A-482F-9C6F-F5A9F8FABF61}" destId="{1118D280-9087-4A64-A8DF-C165308F95FC}" srcOrd="1" destOrd="0" presId="urn:microsoft.com/office/officeart/2005/8/layout/pyramid3"/>
+    <dgm:cxn modelId="{D3CABB38-E31A-45D1-BB89-977CC0867505}" type="presOf" srcId="{6A1D23BC-C3AC-4D99-8D12-DFED8DD025D4}" destId="{59C1A9F1-0284-49D6-AC06-A0A84159DD89}" srcOrd="0" destOrd="0" presId="urn:microsoft.com/office/officeart/2005/8/layout/pyramid3"/>
+    <dgm:cxn modelId="{59510446-F59E-42C0-868A-199BAC74E0D6}" srcId="{6A1D23BC-C3AC-4D99-8D12-DFED8DD025D4}" destId="{87811AA5-D1CD-40C7-B269-D3FF20BB3E92}" srcOrd="0" destOrd="0" parTransId="{2DF22CB7-DD99-4C96-B1A7-8353744C289C}" sibTransId="{E7B36415-D68E-40A6-9E63-0F61D00ACDCD}"/>
+    <dgm:cxn modelId="{64A059E7-2E03-4735-9F31-438671FCC54E}" srcId="{6A1D23BC-C3AC-4D99-8D12-DFED8DD025D4}" destId="{FF855A13-0D9A-482F-9C6F-F5A9F8FABF61}" srcOrd="2" destOrd="0" parTransId="{3299224D-5A4C-468C-8D79-A70B0E3827B4}" sibTransId="{721B1A3D-6D3E-4EE9-853A-315384A4992A}"/>
+    <dgm:cxn modelId="{8BC712F7-4CFF-41EB-9ED8-C2DA43ED59CA}" srcId="{6A1D23BC-C3AC-4D99-8D12-DFED8DD025D4}" destId="{77646417-596F-4F8D-A2D0-A681770B1924}" srcOrd="1" destOrd="0" parTransId="{E9E98D10-219C-4CC5-9FBA-52B099C4BB04}" sibTransId="{6B775264-79C0-4025-BA2D-9B3D2D699E40}"/>
+    <dgm:cxn modelId="{B03A2CDC-8C85-4B94-935D-BEF8854B7826}" type="presOf" srcId="{87811AA5-D1CD-40C7-B269-D3FF20BB3E92}" destId="{283EE8C8-FD28-4788-8E71-C9009793EE4F}" srcOrd="1" destOrd="0" presId="urn:microsoft.com/office/officeart/2005/8/layout/pyramid3"/>
+    <dgm:cxn modelId="{C33D5C9B-212F-4A80-A5EC-E974FF5E21AA}" type="presOf" srcId="{77646417-596F-4F8D-A2D0-A681770B1924}" destId="{B17DE064-8EC9-47BC-A16D-A448C7800284}" srcOrd="1" destOrd="0" presId="urn:microsoft.com/office/officeart/2005/8/layout/pyramid3"/>
+    <dgm:cxn modelId="{550D8C26-0C70-46FD-B33E-F0E6C2E29B69}" type="presOf" srcId="{87811AA5-D1CD-40C7-B269-D3FF20BB3E92}" destId="{720B97A8-FCAB-4143-99C3-9E84F78E0DFF}" srcOrd="0" destOrd="0" presId="urn:microsoft.com/office/officeart/2005/8/layout/pyramid3"/>
+    <dgm:cxn modelId="{61379296-147C-4269-80F4-579626CF3155}" type="presOf" srcId="{77646417-596F-4F8D-A2D0-A681770B1924}" destId="{AA1E9AC3-1FEE-4522-A0D1-48C3B029E26D}" srcOrd="0" destOrd="0" presId="urn:microsoft.com/office/officeart/2005/8/layout/pyramid3"/>
+    <dgm:cxn modelId="{34B85B76-4E7F-4ED4-AA13-690C82F7490D}" type="presOf" srcId="{FF855A13-0D9A-482F-9C6F-F5A9F8FABF61}" destId="{E35640F2-9DB8-4179-A943-13C60EF5B5F4}" srcOrd="0" destOrd="0" presId="urn:microsoft.com/office/officeart/2005/8/layout/pyramid3"/>
+    <dgm:cxn modelId="{97B7B023-C84C-4E2B-BFE3-7EE3A546F0FE}" type="presParOf" srcId="{59C1A9F1-0284-49D6-AC06-A0A84159DD89}" destId="{4B398DB7-7FFE-4D34-9427-F739742E49C4}" srcOrd="0" destOrd="0" presId="urn:microsoft.com/office/officeart/2005/8/layout/pyramid3"/>
+    <dgm:cxn modelId="{25F34504-39B1-40E6-A904-F860B499144A}" type="presParOf" srcId="{4B398DB7-7FFE-4D34-9427-F739742E49C4}" destId="{720B97A8-FCAB-4143-99C3-9E84F78E0DFF}" srcOrd="0" destOrd="0" presId="urn:microsoft.com/office/officeart/2005/8/layout/pyramid3"/>
+    <dgm:cxn modelId="{AE7812BC-B55A-4E2E-ABB6-050DFE053C99}" type="presParOf" srcId="{4B398DB7-7FFE-4D34-9427-F739742E49C4}" destId="{283EE8C8-FD28-4788-8E71-C9009793EE4F}" srcOrd="1" destOrd="0" presId="urn:microsoft.com/office/officeart/2005/8/layout/pyramid3"/>
+    <dgm:cxn modelId="{DD5856AC-9BA6-4ED1-BBDF-A5FC54F62A4D}" type="presParOf" srcId="{59C1A9F1-0284-49D6-AC06-A0A84159DD89}" destId="{3CC0C807-3865-4D64-B78E-EFFCC5EBA5FD}" srcOrd="1" destOrd="0" presId="urn:microsoft.com/office/officeart/2005/8/layout/pyramid3"/>
+    <dgm:cxn modelId="{3DBBD718-1454-4A39-86A3-47F777ABBB94}" type="presParOf" srcId="{3CC0C807-3865-4D64-B78E-EFFCC5EBA5FD}" destId="{AA1E9AC3-1FEE-4522-A0D1-48C3B029E26D}" srcOrd="0" destOrd="0" presId="urn:microsoft.com/office/officeart/2005/8/layout/pyramid3"/>
+    <dgm:cxn modelId="{C7AA9ECC-5352-4077-B1AF-26F9B7CDE6D9}" type="presParOf" srcId="{3CC0C807-3865-4D64-B78E-EFFCC5EBA5FD}" destId="{B17DE064-8EC9-47BC-A16D-A448C7800284}" srcOrd="1" destOrd="0" presId="urn:microsoft.com/office/officeart/2005/8/layout/pyramid3"/>
+    <dgm:cxn modelId="{F58D7387-A28A-46BB-B0ED-F8635CCFD79C}" type="presParOf" srcId="{59C1A9F1-0284-49D6-AC06-A0A84159DD89}" destId="{E8CEBB27-6B22-40F5-BAC7-E407163FCE28}" srcOrd="2" destOrd="0" presId="urn:microsoft.com/office/officeart/2005/8/layout/pyramid3"/>
+    <dgm:cxn modelId="{1ADF2AD6-7CDB-4CED-99EB-23A426054B2D}" type="presParOf" srcId="{E8CEBB27-6B22-40F5-BAC7-E407163FCE28}" destId="{E35640F2-9DB8-4179-A943-13C60EF5B5F4}" srcOrd="0" destOrd="0" presId="urn:microsoft.com/office/officeart/2005/8/layout/pyramid3"/>
+    <dgm:cxn modelId="{48967A05-621F-4368-913A-AA4237F9C83A}" type="presParOf" srcId="{E8CEBB27-6B22-40F5-BAC7-E407163FCE28}" destId="{1118D280-9087-4A64-A8DF-C165308F95FC}" srcOrd="1" destOrd="0" presId="urn:microsoft.com/office/officeart/2005/8/layout/pyramid3"/>
+  </dgm:cxnLst>
+  <dgm:bg/>
+  <dgm:whole/>
+  <dgm:extLst>
+    <a:ext uri="http://schemas.microsoft.com/office/drawing/2008/diagram">
+      <dsp:dataModelExt xmlns:dsp="http://schemas.microsoft.com/office/drawing/2008/diagram" relId="rId6" minVer="http://schemas.openxmlformats.org/drawingml/2006/diagram"/>
+    </a:ext>
+  </dgm:extLst>
+</dgm:dataModel>
+</file>
+
+<file path=ppt/diagrams/drawing1.xml><?xml version="1.0" encoding="utf-8"?>
+<dsp:drawing xmlns:dgm="http://schemas.openxmlformats.org/drawingml/2006/diagram" xmlns:dsp="http://schemas.microsoft.com/office/drawing/2008/diagram" xmlns:a="http://schemas.openxmlformats.org/drawingml/2006/main">
+  <dsp:spTree>
+    <dsp:nvGrpSpPr>
+      <dsp:cNvPr id="0" name=""/>
+      <dsp:cNvGrpSpPr/>
+    </dsp:nvGrpSpPr>
+    <dsp:grpSpPr/>
+    <dsp:sp modelId="{720B97A8-FCAB-4143-99C3-9E84F78E0DFF}">
+      <dsp:nvSpPr>
+        <dsp:cNvPr id="0" name=""/>
+        <dsp:cNvSpPr/>
+      </dsp:nvSpPr>
+      <dsp:spPr>
+        <a:xfrm rot="10800000">
+          <a:off x="0" y="0"/>
+          <a:ext cx="4712029" cy="1210962"/>
+        </a:xfrm>
+        <a:prstGeom prst="trapezoid">
+          <a:avLst>
+            <a:gd name="adj" fmla="val 64852"/>
+          </a:avLst>
+        </a:prstGeom>
+        <a:solidFill>
+          <a:schemeClr val="accent2">
+            <a:hueOff val="0"/>
+            <a:satOff val="0"/>
+            <a:lumOff val="0"/>
+            <a:alphaOff val="0"/>
+          </a:schemeClr>
+        </a:solidFill>
+        <a:ln>
+          <a:noFill/>
+        </a:ln>
+        <a:effectLst/>
+        <a:sp3d extrusionH="381000" contourW="38100" prstMaterial="matte">
+          <a:contourClr>
+            <a:schemeClr val="lt1"/>
+          </a:contourClr>
+        </a:sp3d>
+      </dsp:spPr>
+      <dsp:style>
+        <a:lnRef idx="0">
+          <a:scrgbClr r="0" g="0" b="0"/>
+        </a:lnRef>
+        <a:fillRef idx="1">
+          <a:scrgbClr r="0" g="0" b="0"/>
+        </a:fillRef>
+        <a:effectRef idx="0">
+          <a:scrgbClr r="0" g="0" b="0"/>
+        </a:effectRef>
+        <a:fontRef idx="minor">
+          <a:schemeClr val="lt1"/>
+        </a:fontRef>
+      </dsp:style>
+      <dsp:txBody>
+        <a:bodyPr spcFirstLastPara="0" vert="horz" wrap="square" lIns="43180" tIns="43180" rIns="43180" bIns="43180" numCol="1" spcCol="1270" anchor="ctr" anchorCtr="0">
+          <a:noAutofit/>
+        </a:bodyPr>
+        <a:lstStyle/>
+        <a:p>
+          <a:pPr lvl="0" algn="ctr" defTabSz="1511300">
+            <a:lnSpc>
+              <a:spcPct val="90000"/>
+            </a:lnSpc>
+            <a:spcBef>
+              <a:spcPct val="0"/>
+            </a:spcBef>
+            <a:spcAft>
+              <a:spcPct val="35000"/>
+            </a:spcAft>
+          </a:pPr>
+          <a:r>
+            <a:rPr lang="en-US" sz="3400" kern="1200" dirty="0" smtClean="0"/>
+            <a:t>Unknown, dynamic</a:t>
+          </a:r>
+          <a:endParaRPr lang="en-CA" sz="3400" kern="1200" dirty="0"/>
+        </a:p>
+      </dsp:txBody>
+      <dsp:txXfrm rot="-10800000">
+        <a:off x="824605" y="0"/>
+        <a:ext cx="3062818" cy="1210962"/>
+      </dsp:txXfrm>
+    </dsp:sp>
+    <dsp:sp modelId="{AA1E9AC3-1FEE-4522-A0D1-48C3B029E26D}">
+      <dsp:nvSpPr>
+        <dsp:cNvPr id="0" name=""/>
+        <dsp:cNvSpPr/>
+      </dsp:nvSpPr>
+      <dsp:spPr>
+        <a:xfrm rot="10800000">
+          <a:off x="785338" y="1210962"/>
+          <a:ext cx="3141352" cy="1210962"/>
+        </a:xfrm>
+        <a:prstGeom prst="trapezoid">
+          <a:avLst>
+            <a:gd name="adj" fmla="val 64852"/>
+          </a:avLst>
+        </a:prstGeom>
+        <a:solidFill>
+          <a:schemeClr val="accent2">
+            <a:hueOff val="-5199329"/>
+            <a:satOff val="-8953"/>
+            <a:lumOff val="-4901"/>
+            <a:alphaOff val="0"/>
+          </a:schemeClr>
+        </a:solidFill>
+        <a:ln>
+          <a:noFill/>
+        </a:ln>
+        <a:effectLst/>
+        <a:sp3d extrusionH="381000" contourW="38100" prstMaterial="matte">
+          <a:contourClr>
+            <a:schemeClr val="lt1"/>
+          </a:contourClr>
+        </a:sp3d>
+      </dsp:spPr>
+      <dsp:style>
+        <a:lnRef idx="0">
+          <a:scrgbClr r="0" g="0" b="0"/>
+        </a:lnRef>
+        <a:fillRef idx="1">
+          <a:scrgbClr r="0" g="0" b="0"/>
+        </a:fillRef>
+        <a:effectRef idx="0">
+          <a:scrgbClr r="0" g="0" b="0"/>
+        </a:effectRef>
+        <a:fontRef idx="minor">
+          <a:schemeClr val="lt1"/>
+        </a:fontRef>
+      </dsp:style>
+      <dsp:txBody>
+        <a:bodyPr spcFirstLastPara="0" vert="horz" wrap="square" lIns="43180" tIns="43180" rIns="43180" bIns="43180" numCol="1" spcCol="1270" anchor="ctr" anchorCtr="0">
+          <a:noAutofit/>
+        </a:bodyPr>
+        <a:lstStyle/>
+        <a:p>
+          <a:pPr lvl="0" algn="ctr" defTabSz="1511300">
+            <a:lnSpc>
+              <a:spcPct val="90000"/>
+            </a:lnSpc>
+            <a:spcBef>
+              <a:spcPct val="0"/>
+            </a:spcBef>
+            <a:spcAft>
+              <a:spcPct val="35000"/>
+            </a:spcAft>
+          </a:pPr>
+          <a:r>
+            <a:rPr lang="en-US" sz="3400" kern="1200" dirty="0" smtClean="0"/>
+            <a:t>Unknown, static</a:t>
+          </a:r>
+          <a:endParaRPr lang="en-CA" sz="3400" kern="1200" dirty="0"/>
+        </a:p>
+      </dsp:txBody>
+      <dsp:txXfrm rot="-10800000">
+        <a:off x="1335074" y="1210962"/>
+        <a:ext cx="2041879" cy="1210962"/>
+      </dsp:txXfrm>
+    </dsp:sp>
+    <dsp:sp modelId="{E35640F2-9DB8-4179-A943-13C60EF5B5F4}">
+      <dsp:nvSpPr>
+        <dsp:cNvPr id="0" name=""/>
+        <dsp:cNvSpPr/>
+      </dsp:nvSpPr>
+      <dsp:spPr>
+        <a:xfrm rot="10800000">
+          <a:off x="1570676" y="2421924"/>
+          <a:ext cx="1570676" cy="1210962"/>
+        </a:xfrm>
+        <a:prstGeom prst="trapezoid">
+          <a:avLst>
+            <a:gd name="adj" fmla="val 64852"/>
+          </a:avLst>
+        </a:prstGeom>
+        <a:solidFill>
+          <a:schemeClr val="accent2">
+            <a:hueOff val="-10398658"/>
+            <a:satOff val="-17905"/>
+            <a:lumOff val="-9802"/>
+            <a:alphaOff val="0"/>
+          </a:schemeClr>
+        </a:solidFill>
+        <a:ln>
+          <a:noFill/>
+        </a:ln>
+        <a:effectLst/>
+        <a:sp3d extrusionH="381000" contourW="38100" prstMaterial="matte">
+          <a:contourClr>
+            <a:schemeClr val="lt1"/>
+          </a:contourClr>
+        </a:sp3d>
+      </dsp:spPr>
+      <dsp:style>
+        <a:lnRef idx="0">
+          <a:scrgbClr r="0" g="0" b="0"/>
+        </a:lnRef>
+        <a:fillRef idx="1">
+          <a:scrgbClr r="0" g="0" b="0"/>
+        </a:fillRef>
+        <a:effectRef idx="0">
+          <a:scrgbClr r="0" g="0" b="0"/>
+        </a:effectRef>
+        <a:fontRef idx="minor">
+          <a:schemeClr val="lt1"/>
+        </a:fontRef>
+      </dsp:style>
+      <dsp:txBody>
+        <a:bodyPr spcFirstLastPara="0" vert="horz" wrap="square" lIns="43180" tIns="43180" rIns="43180" bIns="43180" numCol="1" spcCol="1270" anchor="ctr" anchorCtr="0">
+          <a:noAutofit/>
+        </a:bodyPr>
+        <a:lstStyle/>
+        <a:p>
+          <a:pPr lvl="0" algn="ctr" defTabSz="1511300">
+            <a:lnSpc>
+              <a:spcPct val="90000"/>
+            </a:lnSpc>
+            <a:spcBef>
+              <a:spcPct val="0"/>
+            </a:spcBef>
+            <a:spcAft>
+              <a:spcPct val="35000"/>
+            </a:spcAft>
+          </a:pPr>
+          <a:r>
+            <a:rPr lang="en-US" sz="3400" kern="1200" dirty="0" smtClean="0"/>
+            <a:t>Known</a:t>
+          </a:r>
+          <a:endParaRPr lang="en-CA" sz="3400" kern="1200" dirty="0"/>
+        </a:p>
+      </dsp:txBody>
+      <dsp:txXfrm rot="-10800000">
+        <a:off x="1570676" y="2421924"/>
+        <a:ext cx="1570676" cy="1210962"/>
+      </dsp:txXfrm>
+    </dsp:sp>
+  </dsp:spTree>
+</dsp:drawing>
+</file>
+
+<file path=ppt/diagrams/layout1.xml><?xml version="1.0" encoding="utf-8"?>
+<dgm:layoutDef xmlns:dgm="http://schemas.openxmlformats.org/drawingml/2006/diagram" xmlns:a="http://schemas.openxmlformats.org/drawingml/2006/main" uniqueId="urn:microsoft.com/office/officeart/2005/8/layout/pyramid3">
+  <dgm:title val=""/>
+  <dgm:desc val=""/>
+  <dgm:catLst>
+    <dgm:cat type="pyramid" pri="2000"/>
+  </dgm:catLst>
+  <dgm:sampData useDef="1">
+    <dgm:dataModel>
+      <dgm:ptLst/>
+      <dgm:bg/>
+      <dgm:whole/>
+    </dgm:dataModel>
+  </dgm:sampData>
+  <dgm:styleData>
+    <dgm:dataModel>
+      <dgm:ptLst>
+        <dgm:pt modelId="0" type="doc"/>
+        <dgm:pt modelId="1"/>
+        <dgm:pt modelId="2"/>
+      </dgm:ptLst>
+      <dgm:cxnLst>
+        <dgm:cxn modelId="3" srcId="0" destId="1" srcOrd="0" destOrd="0"/>
+        <dgm:cxn modelId="4" srcId="0" destId="2" srcOrd="1" destOrd="0"/>
+      </dgm:cxnLst>
+      <dgm:bg/>
+      <dgm:whole/>
+    </dgm:dataModel>
+  </dgm:styleData>
+  <dgm:clrData>
+    <dgm:dataModel>
+      <dgm:ptLst>
+        <dgm:pt modelId="0" type="doc"/>
+        <dgm:pt modelId="1"/>
+        <dgm:pt modelId="2"/>
+        <dgm:pt modelId="3"/>
+        <dgm:pt modelId="4"/>
+      </dgm:ptLst>
+      <dgm:cxnLst>
+        <dgm:cxn modelId="5" srcId="0" destId="1" srcOrd="0" destOrd="0"/>
+        <dgm:cxn modelId="6" srcId="0" destId="2" srcOrd="1" destOrd="0"/>
+        <dgm:cxn modelId="7" srcId="0" destId="3" srcOrd="2" destOrd="0"/>
+        <dgm:cxn modelId="8" srcId="0" destId="4" srcOrd="3" destOrd="0"/>
+      </dgm:cxnLst>
+      <dgm:bg/>
+      <dgm:whole/>
+    </dgm:dataModel>
+  </dgm:clrData>
+  <dgm:layoutNode name="Name0">
+    <dgm:varLst>
+      <dgm:dir/>
+      <dgm:animLvl val="lvl"/>
+      <dgm:resizeHandles val="exact"/>
+    </dgm:varLst>
+    <dgm:choose name="Name1">
+      <dgm:if name="Name2" func="var" arg="dir" op="equ" val="norm">
+        <dgm:alg type="pyra">
+          <dgm:param type="linDir" val="fromT"/>
+          <dgm:param type="txDir" val="fromT"/>
+          <dgm:param type="pyraAcctPos" val="aft"/>
+          <dgm:param type="pyraAcctTxMar" val="step"/>
+          <dgm:param type="pyraAcctBkgdNode" val="acctBkgd"/>
+          <dgm:param type="pyraAcctTxNode" val="acctTx"/>
+          <dgm:param type="pyraLvlNode" val="level"/>
+        </dgm:alg>
+      </dgm:if>
+      <dgm:else name="Name3">
+        <dgm:alg type="pyra">
+          <dgm:param type="linDir" val="fromT"/>
+          <dgm:param type="txDir" val="fromT"/>
+          <dgm:param type="pyraAcctPos" val="bef"/>
+          <dgm:param type="pyraAcctTxMar" val="step"/>
+          <dgm:param type="pyraAcctBkgdNode" val="acctBkgd"/>
+          <dgm:param type="pyraAcctTxNode" val="acctTx"/>
+          <dgm:param type="pyraLvlNode" val="level"/>
+        </dgm:alg>
+      </dgm:else>
+    </dgm:choose>
+    <dgm:shape xmlns:r="http://schemas.openxmlformats.org/officeDocument/2006/relationships" r:blip="">
+      <dgm:adjLst/>
+    </dgm:shape>
+    <dgm:presOf/>
+    <dgm:choose name="Name4">
+      <dgm:if name="Name5" axis="root des" ptType="all node" func="maxDepth" op="gte" val="2">
+        <dgm:constrLst>
+          <dgm:constr type="primFontSz" for="des" forName="levelTx" op="equ"/>
+          <dgm:constr type="secFontSz" for="des" forName="acctTx" op="equ"/>
+          <dgm:constr type="pyraAcctRatio" val="0.32"/>
+        </dgm:constrLst>
+      </dgm:if>
+      <dgm:else name="Name6">
+        <dgm:constrLst>
+          <dgm:constr type="primFontSz" for="des" forName="levelTx" op="equ"/>
+          <dgm:constr type="secFontSz" for="des" forName="acctTx" op="equ"/>
+          <dgm:constr type="pyraAcctRatio"/>
+        </dgm:constrLst>
+      </dgm:else>
+    </dgm:choose>
+    <dgm:ruleLst/>
+    <dgm:forEach name="Name7" axis="ch" ptType="node">
+      <dgm:layoutNode name="Name8">
+        <dgm:alg type="composite">
+          <dgm:param type="horzAlign" val="none"/>
+        </dgm:alg>
+        <dgm:shape xmlns:r="http://schemas.openxmlformats.org/officeDocument/2006/relationships" r:blip="">
+          <dgm:adjLst/>
+        </dgm:shape>
+        <dgm:presOf/>
+        <dgm:choose name="Name9">
+          <dgm:if name="Name10" axis="self" ptType="node" func="revPos" op="equ" val="1">
+            <dgm:constrLst>
+              <dgm:constr type="ctrX" for="ch" forName="acctBkgd" val="1"/>
+              <dgm:constr type="ctrY" for="ch" forName="acctBkgd" val="1"/>
+              <dgm:constr type="w" for="ch" forName="acctBkgd" val="1"/>
+              <dgm:constr type="h" for="ch" forName="acctBkgd" val="1"/>
+              <dgm:constr type="ctrX" for="ch" forName="acctTx" val="1"/>
+              <dgm:constr type="ctrY" for="ch" forName="acctTx" val="1"/>
+              <dgm:constr type="w" for="ch" forName="acctTx" val="1"/>
+              <dgm:constr type="h" for="ch" forName="acctTx" val="1"/>
+              <dgm:constr type="ctrX" for="ch" forName="level" val="1"/>
+              <dgm:constr type="ctrY" for="ch" forName="level" val="1"/>
+              <dgm:constr type="w" for="ch" forName="level" val="1"/>
+              <dgm:constr type="h" for="ch" forName="level" val="1"/>
+              <dgm:constr type="ctrX" for="ch" forName="levelTx" refType="ctrX" refFor="ch" refForName="level"/>
+              <dgm:constr type="ctrY" for="ch" forName="levelTx" refType="ctrY" refFor="ch" refForName="level"/>
+              <dgm:constr type="w" for="ch" forName="levelTx" refType="w" refFor="ch" refForName="level"/>
+              <dgm:constr type="h" for="ch" forName="levelTx" refType="h" refFor="ch" refForName="level"/>
+            </dgm:constrLst>
+          </dgm:if>
+          <dgm:else name="Name11">
+            <dgm:constrLst>
+              <dgm:constr type="ctrX" for="ch" forName="acctBkgd" val="1"/>
+              <dgm:constr type="ctrY" for="ch" forName="acctBkgd" val="1"/>
+              <dgm:constr type="w" for="ch" forName="acctBkgd" val="1"/>
+              <dgm:constr type="h" for="ch" forName="acctBkgd" val="1"/>
+              <dgm:constr type="ctrX" for="ch" forName="acctTx" val="1"/>
+              <dgm:constr type="ctrY" for="ch" forName="acctTx" val="1"/>
+              <dgm:constr type="w" for="ch" forName="acctTx" val="1"/>
+              <dgm:constr type="h" for="ch" forName="acctTx" val="1"/>
+              <dgm:constr type="ctrX" for="ch" forName="level" val="1"/>
+              <dgm:constr type="ctrY" for="ch" forName="level" val="1"/>
+              <dgm:constr type="w" for="ch" forName="level" val="1"/>
+              <dgm:constr type="h" for="ch" forName="level" val="1"/>
+              <dgm:constr type="ctrX" for="ch" forName="levelTx" refType="ctrX" refFor="ch" refForName="level"/>
+              <dgm:constr type="ctrY" for="ch" forName="levelTx" refType="ctrY" refFor="ch" refForName="level"/>
+              <dgm:constr type="w" for="ch" forName="levelTx" refType="w" refFor="ch" refForName="level" fact="0.65"/>
+              <dgm:constr type="h" for="ch" forName="levelTx" refType="h" refFor="ch" refForName="level"/>
+            </dgm:constrLst>
+          </dgm:else>
+        </dgm:choose>
+        <dgm:ruleLst/>
+        <dgm:choose name="Name12">
+          <dgm:if name="Name13" axis="ch" ptType="node" func="cnt" op="gte" val="1">
+            <dgm:layoutNode name="acctBkgd" styleLbl="alignAcc1">
+              <dgm:alg type="sp"/>
+              <dgm:shape xmlns:r="http://schemas.openxmlformats.org/officeDocument/2006/relationships" type="nonIsoscelesTrapezoid" r:blip="">
+                <dgm:adjLst/>
+              </dgm:shape>
+              <dgm:presOf axis="des" ptType="node"/>
+              <dgm:constrLst/>
+              <dgm:ruleLst/>
+            </dgm:layoutNode>
+            <dgm:layoutNode name="acctTx" styleLbl="alignAcc1">
+              <dgm:varLst>
+                <dgm:bulletEnabled val="1"/>
+              </dgm:varLst>
+              <dgm:alg type="tx">
+                <dgm:param type="stBulletLvl" val="1"/>
+                <dgm:param type="txAnchorVertCh" val="t"/>
+              </dgm:alg>
+              <dgm:shape xmlns:r="http://schemas.openxmlformats.org/officeDocument/2006/relationships" type="nonIsoscelesTrapezoid" r:blip="" hideGeom="1">
+                <dgm:adjLst/>
+              </dgm:shape>
+              <dgm:presOf axis="des" ptType="node"/>
+              <dgm:constrLst>
+                <dgm:constr type="secFontSz" val="65"/>
+                <dgm:constr type="primFontSz" refType="secFontSz"/>
+                <dgm:constr type="tMarg" refType="secFontSz" fact="0.3"/>
+                <dgm:constr type="bMarg" refType="secFontSz" fact="0.3"/>
+                <dgm:constr type="lMarg" refType="secFontSz" fact="0.3"/>
+                <dgm:constr type="rMarg" refType="secFontSz" fact="0.3"/>
+              </dgm:constrLst>
+              <dgm:ruleLst>
+                <dgm:rule type="secFontSz" val="5" fact="NaN" max="NaN"/>
+              </dgm:ruleLst>
+            </dgm:layoutNode>
+          </dgm:if>
+          <dgm:else name="Name14"/>
+        </dgm:choose>
+        <dgm:layoutNode name="level">
+          <dgm:varLst>
+            <dgm:chMax val="1"/>
+            <dgm:bulletEnabled val="1"/>
+          </dgm:varLst>
+          <dgm:alg type="sp"/>
+          <dgm:shape xmlns:r="http://schemas.openxmlformats.org/officeDocument/2006/relationships" type="trapezoid" r:blip="">
+            <dgm:adjLst/>
+          </dgm:shape>
+          <dgm:presOf axis="self"/>
+          <dgm:constrLst>
+            <dgm:constr type="h" val="500"/>
+            <dgm:constr type="w" val="1"/>
+          </dgm:constrLst>
+          <dgm:ruleLst/>
+        </dgm:layoutNode>
+        <dgm:layoutNode name="levelTx" styleLbl="revTx">
+          <dgm:varLst>
+            <dgm:chMax val="1"/>
+            <dgm:bulletEnabled val="1"/>
+          </dgm:varLst>
+          <dgm:alg type="tx"/>
+          <dgm:shape xmlns:r="http://schemas.openxmlformats.org/officeDocument/2006/relationships" type="rect" r:blip="" hideGeom="1">
+            <dgm:adjLst/>
+          </dgm:shape>
+          <dgm:presOf axis="self"/>
+          <dgm:constrLst>
+            <dgm:constr type="tMarg" refType="primFontSz" fact="0.1"/>
+            <dgm:constr type="bMarg" refType="primFontSz" fact="0.1"/>
+            <dgm:constr type="lMarg" refType="primFontSz" fact="0.1"/>
+            <dgm:constr type="rMarg" refType="primFontSz" fact="0.1"/>
+            <dgm:constr type="primFontSz" val="65"/>
+          </dgm:constrLst>
+          <dgm:ruleLst>
+            <dgm:rule type="primFontSz" val="5" fact="NaN" max="NaN"/>
+          </dgm:ruleLst>
+        </dgm:layoutNode>
+      </dgm:layoutNode>
+    </dgm:forEach>
+  </dgm:layoutNode>
+</dgm:layoutDef>
+</file>
+
+<file path=ppt/diagrams/quickStyle1.xml><?xml version="1.0" encoding="utf-8"?>
+<dgm:styleDef xmlns:dgm="http://schemas.openxmlformats.org/drawingml/2006/diagram" xmlns:a="http://schemas.openxmlformats.org/drawingml/2006/main" uniqueId="urn:microsoft.com/office/officeart/2005/8/quickstyle/3d5">
+  <dgm:title val=""/>
+  <dgm:desc val=""/>
+  <dgm:catLst>
+    <dgm:cat type="3D" pri="11500"/>
+  </dgm:catLst>
+  <dgm:scene3d>
+    <a:camera prst="isometricOffAxis2Left" zoom="95000"/>
+    <a:lightRig rig="flat" dir="t"/>
+  </dgm:scene3d>
+  <dgm:styleLbl name="node0">
+    <dgm:scene3d>
+      <a:camera prst="orthographicFront"/>
+      <a:lightRig rig="threePt" dir="t"/>
+    </dgm:scene3d>
+    <dgm:sp3d extrusionH="381000" contourW="38100" prstMaterial="matte">
+      <a:contourClr>
+        <a:schemeClr val="lt1"/>
+      </a:contourClr>
+    </dgm:sp3d>
+    <dgm:txPr/>
+    <dgm:style>
+      <a:lnRef idx="0">
+        <a:scrgbClr r="0" g="0" b="0"/>
+      </a:lnRef>
+      <a:fillRef idx="1">
+        <a:scrgbClr r="0" g="0" b="0"/>
+      </a:fillRef>
+      <a:effectRef idx="0">
+        <a:scrgbClr r="0" g="0" b="0"/>
+      </a:effectRef>
+      <a:fontRef idx="minor">
+        <a:schemeClr val="lt1"/>
+      </a:fontRef>
+    </dgm:style>
+  </dgm:styleLbl>
+  <dgm:styleLbl name="lnNode1">
+    <dgm:scene3d>
+      <a:camera prst="orthographicFront"/>
+      <a:lightRig rig="threePt" dir="t"/>
+    </dgm:scene3d>
+    <dgm:sp3d extrusionH="381000" contourW="38100" prstMaterial="matte">
+      <a:contourClr>
+        <a:schemeClr val="lt1"/>
+      </a:contourClr>
+    </dgm:sp3d>
+    <dgm:txPr/>
+    <dgm:style>
+      <a:lnRef idx="0">
+        <a:scrgbClr r="0" g="0" b="0"/>
+      </a:lnRef>
+      <a:fillRef idx="1">
+        <a:scrgbClr r="0" g="0" b="0"/>
+      </a:fillRef>
+      <a:effectRef idx="0">
+        <a:scrgbClr r="0" g="0" b="0"/>
+      </a:effectRef>
+      <a:fontRef idx="minor">
+        <a:schemeClr val="lt1"/>
+      </a:fontRef>
+    </dgm:style>
+  </dgm:styleLbl>
+  <dgm:styleLbl name="vennNode1">
+    <dgm:scene3d>
+      <a:camera prst="orthographicFront"/>
+      <a:lightRig rig="threePt" dir="t"/>
+    </dgm:scene3d>
+    <dgm:sp3d extrusionH="381000" contourW="38100" prstMaterial="matte">
+      <a:contourClr>
+        <a:schemeClr val="lt1"/>
+      </a:contourClr>
+    </dgm:sp3d>
+    <dgm:txPr/>
+    <dgm:style>
+      <a:lnRef idx="0">
+        <a:scrgbClr r="0" g="0" b="0"/>
+      </a:lnRef>
+      <a:fillRef idx="1">
+        <a:scrgbClr r="0" g="0" b="0"/>
+      </a:fillRef>
+      <a:effectRef idx="0">
+        <a:scrgbClr r="0" g="0" b="0"/>
+      </a:effectRef>
+      <a:fontRef idx="minor">
+        <a:schemeClr val="tx1"/>
+      </a:fontRef>
+    </dgm:style>
+  </dgm:styleLbl>
+  <dgm:styleLbl name="alignNode1">
+    <dgm:scene3d>
+      <a:camera prst="orthographicFront"/>
+      <a:lightRig rig="threePt" dir="t"/>
+    </dgm:scene3d>
+    <dgm:sp3d extrusionH="381000" contourW="38100" prstMaterial="matte">
+      <a:contourClr>
+        <a:schemeClr val="lt1"/>
+      </a:contourClr>
+    </dgm:sp3d>
+    <dgm:txPr/>
+    <dgm:style>
+      <a:lnRef idx="1">
+        <a:scrgbClr r="0" g="0" b="0"/>
+      </a:lnRef>
+      <a:fillRef idx="1">
+        <a:scrgbClr r="0" g="0" b="0"/>
+      </a:fillRef>
+      <a:effectRef idx="0">
+        <a:scrgbClr r="0" g="0" b="0"/>
+      </a:effectRef>
+      <a:fontRef idx="minor">
+        <a:schemeClr val="lt1"/>
+      </a:fontRef>
+    </dgm:style>
+  </dgm:styleLbl>
+  <dgm:styleLbl name="node1">
+    <dgm:scene3d>
+      <a:camera prst="orthographicFront"/>
+      <a:lightRig rig="threePt" dir="t"/>
+    </dgm:scene3d>
+    <dgm:sp3d extrusionH="381000" contourW="38100" prstMaterial="matte">
+      <a:contourClr>
+        <a:schemeClr val="lt1"/>
+      </a:contourClr>
+    </dgm:sp3d>
+    <dgm:txPr/>
+    <dgm:style>
+      <a:lnRef idx="0">
+        <a:scrgbClr r="0" g="0" b="0"/>
+      </a:lnRef>
+      <a:fillRef idx="1">
+        <a:scrgbClr r="0" g="0" b="0"/>
+      </a:fillRef>
+      <a:effectRef idx="0">
+        <a:scrgbClr r="0" g="0" b="0"/>
+      </a:effectRef>
+      <a:fontRef idx="minor">
+        <a:schemeClr val="lt1"/>
+      </a:fontRef>
+    </dgm:style>
+  </dgm:styleLbl>
+  <dgm:styleLbl name="node2">
+    <dgm:scene3d>
+      <a:camera prst="orthographicFront"/>
+      <a:lightRig rig="threePt" dir="t"/>
+    </dgm:scene3d>
+    <dgm:sp3d extrusionH="381000" contourW="38100" prstMaterial="matte">
+      <a:contourClr>
+        <a:schemeClr val="lt1"/>
+      </a:contourClr>
+    </dgm:sp3d>
+    <dgm:txPr/>
+    <dgm:style>
+      <a:lnRef idx="0">
+        <a:scrgbClr r="0" g="0" b="0"/>
+      </a:lnRef>
+      <a:fillRef idx="1">
+        <a:scrgbClr r="0" g="0" b="0"/>
+      </a:fillRef>
+      <a:effectRef idx="0">
+        <a:scrgbClr r="0" g="0" b="0"/>
+      </a:effectRef>
+      <a:fontRef idx="minor">
+        <a:schemeClr val="lt1"/>
+      </a:fontRef>
+    </dgm:style>
+  </dgm:styleLbl>
+  <dgm:styleLbl name="node3">
+    <dgm:scene3d>
+      <a:camera prst="orthographicFront"/>
+      <a:lightRig rig="threePt" dir="t"/>
+    </dgm:scene3d>
+    <dgm:sp3d extrusionH="381000" contourW="38100" prstMaterial="matte">
+      <a:contourClr>
+        <a:schemeClr val="lt1"/>
+      </a:contourClr>
+    </dgm:sp3d>
+    <dgm:txPr/>
+    <dgm:style>
+      <a:lnRef idx="0">
+        <a:scrgbClr r="0" g="0" b="0"/>
+      </a:lnRef>
+      <a:fillRef idx="1">
+        <a:scrgbClr r="0" g="0" b="0"/>
+      </a:fillRef>
+      <a:effectRef idx="0">
+        <a:scrgbClr r="0" g="0" b="0"/>
+      </a:effectRef>
+      <a:fontRef idx="minor">
+        <a:schemeClr val="lt1"/>
+      </a:fontRef>
+    </dgm:style>
+  </dgm:styleLbl>
+  <dgm:styleLbl name="node4">
+    <dgm:scene3d>
+      <a:camera prst="orthographicFront"/>
+      <a:lightRig rig="threePt" dir="t"/>
+    </dgm:scene3d>
+    <dgm:sp3d extrusionH="381000" contourW="38100" prstMaterial="matte">
+      <a:contourClr>
+        <a:schemeClr val="lt1"/>
+      </a:contourClr>
+    </dgm:sp3d>
+    <dgm:txPr/>
+    <dgm:style>
+      <a:lnRef idx="0">
+        <a:scrgbClr r="0" g="0" b="0"/>
+      </a:lnRef>
+      <a:fillRef idx="1">
+        <a:scrgbClr r="0" g="0" b="0"/>
+      </a:fillRef>
+      <a:effectRef idx="0">
+        <a:scrgbClr r="0" g="0" b="0"/>
+      </a:effectRef>
+      <a:fontRef idx="minor">
+        <a:schemeClr val="lt1"/>
+      </a:fontRef>
+    </dgm:style>
+  </dgm:styleLbl>
+  <dgm:styleLbl name="fgImgPlace1">
+    <dgm:scene3d>
+      <a:camera prst="orthographicFront"/>
+      <a:lightRig rig="threePt" dir="t"/>
+    </dgm:scene3d>
+    <dgm:sp3d z="57150" extrusionH="63500" contourW="12700" prstMaterial="matte">
+      <a:contourClr>
+        <a:schemeClr val="lt1"/>
+      </a:contourClr>
+    </dgm:sp3d>
+    <dgm:txPr/>
+    <dgm:style>
+      <a:lnRef idx="0">
+        <a:scrgbClr r="0" g="0" b="0"/>
+      </a:lnRef>
+      <a:fillRef idx="1">
+        <a:scrgbClr r="0" g="0" b="0"/>
+      </a:fillRef>
+      <a:effectRef idx="0">
+        <a:scrgbClr r="0" g="0" b="0"/>
+      </a:effectRef>
+      <a:fontRef idx="minor"/>
+    </dgm:style>
+  </dgm:styleLbl>
+  <dgm:styleLbl name="alignImgPlace1">
+    <dgm:scene3d>
+      <a:camera prst="orthographicFront"/>
+      <a:lightRig rig="threePt" dir="t"/>
+    </dgm:scene3d>
+    <dgm:sp3d extrusionH="63500" contourW="12700" prstMaterial="matte">
+      <a:contourClr>
+        <a:schemeClr val="lt1"/>
+      </a:contourClr>
+    </dgm:sp3d>
+    <dgm:txPr/>
+    <dgm:style>
+      <a:lnRef idx="0">
+        <a:scrgbClr r="0" g="0" b="0"/>
+      </a:lnRef>
+      <a:fillRef idx="1">
+        <a:scrgbClr r="0" g="0" b="0"/>
+      </a:fillRef>
+      <a:effectRef idx="0">
+        <a:scrgbClr r="0" g="0" b="0"/>
+      </a:effectRef>
+      <a:fontRef idx="minor"/>
+    </dgm:style>
+  </dgm:styleLbl>
+  <dgm:styleLbl name="bgImgPlace1">
+    <dgm:scene3d>
+      <a:camera prst="orthographicFront"/>
+      <a:lightRig rig="threePt" dir="t"/>
+    </dgm:scene3d>
+    <dgm:sp3d z="-381000" extrusionH="63500" contourW="12700" prstMaterial="matte">
+      <a:contourClr>
+        <a:schemeClr val="lt1"/>
+      </a:contourClr>
+    </dgm:sp3d>
+    <dgm:txPr/>
+    <dgm:style>
+      <a:lnRef idx="0">
+        <a:scrgbClr r="0" g="0" b="0"/>
+      </a:lnRef>
+      <a:fillRef idx="1">
+        <a:scrgbClr r="0" g="0" b="0"/>
+      </a:fillRef>
+      <a:effectRef idx="0">
+        <a:scrgbClr r="0" g="0" b="0"/>
+      </a:effectRef>
+      <a:fontRef idx="minor"/>
+    </dgm:style>
+  </dgm:styleLbl>
+  <dgm:styleLbl name="sibTrans2D1">
+    <dgm:scene3d>
+      <a:camera prst="orthographicFront"/>
+      <a:lightRig rig="threePt" dir="t"/>
+    </dgm:scene3d>
+    <dgm:sp3d z="-52400" extrusionH="181000" contourW="38100" prstMaterial="matte">
+      <a:contourClr>
+        <a:schemeClr val="lt1"/>
+      </a:contourClr>
+    </dgm:sp3d>
+    <dgm:txPr/>
+    <dgm:style>
+      <a:lnRef idx="0">
+        <a:scrgbClr r="0" g="0" b="0"/>
+      </a:lnRef>
+      <a:fillRef idx="1">
+        <a:scrgbClr r="0" g="0" b="0"/>
+      </a:fillRef>
+      <a:effectRef idx="0">
+        <a:scrgbClr r="0" g="0" b="0"/>
+      </a:effectRef>
+      <a:fontRef idx="minor">
+        <a:schemeClr val="lt1"/>
+      </a:fontRef>
+    </dgm:style>
+  </dgm:styleLbl>
+  <dgm:styleLbl name="fgSibTrans2D1">
+    <dgm:scene3d>
+      <a:camera prst="orthographicFront"/>
+      <a:lightRig rig="threePt" dir="t"/>
+    </dgm:scene3d>
+    <dgm:sp3d z="57150" extrusionH="63500" contourW="12700" prstMaterial="matte">
+      <a:contourClr>
+        <a:schemeClr val="dk1">
+          <a:tint val="20000"/>
+        </a:schemeClr>
+      </a:contourClr>
+    </dgm:sp3d>
+    <dgm:txPr/>
+    <dgm:style>
+      <a:lnRef idx="0">
+        <a:scrgbClr r="0" g="0" b="0"/>
+      </a:lnRef>
+      <a:fillRef idx="1">
+        <a:scrgbClr r="0" g="0" b="0"/>
+      </a:fillRef>
+      <a:effectRef idx="0">
+        <a:scrgbClr r="0" g="0" b="0"/>
+      </a:effectRef>
+      <a:fontRef idx="minor">
+        <a:schemeClr val="lt1"/>
+      </a:fontRef>
+    </dgm:style>
+  </dgm:styleLbl>
+  <dgm:styleLbl name="bgSibTrans2D1">
+    <dgm:scene3d>
+      <a:camera prst="orthographicFront"/>
+      <a:lightRig rig="threePt" dir="t"/>
+    </dgm:scene3d>
+    <dgm:sp3d z="-381000" extrusionH="63500" contourW="12700" prstMaterial="matte">
+      <a:contourClr>
+        <a:schemeClr val="dk1">
+          <a:tint val="20000"/>
+        </a:schemeClr>
+      </a:contourClr>
+    </dgm:sp3d>
+    <dgm:txPr/>
+    <dgm:style>
+      <a:lnRef idx="0">
+        <a:scrgbClr r="0" g="0" b="0"/>
+      </a:lnRef>
+      <a:fillRef idx="1">
+        <a:scrgbClr r="0" g="0" b="0"/>
+      </a:fillRef>
+      <a:effectRef idx="0">
+        <a:scrgbClr r="0" g="0" b="0"/>
+      </a:effectRef>
+      <a:fontRef idx="minor">
+        <a:schemeClr val="lt1"/>
+      </a:fontRef>
+    </dgm:style>
+  </dgm:styleLbl>
+  <dgm:styleLbl name="sibTrans1D1">
+    <dgm:scene3d>
+      <a:camera prst="orthographicFront"/>
+      <a:lightRig rig="threePt" dir="t"/>
+    </dgm:scene3d>
+    <dgm:sp3d z="-40000" prstMaterial="matte"/>
+    <dgm:txPr/>
+    <dgm:style>
+      <a:lnRef idx="1">
+        <a:scrgbClr r="0" g="0" b="0"/>
+      </a:lnRef>
+      <a:fillRef idx="0">
+        <a:scrgbClr r="0" g="0" b="0"/>
+      </a:fillRef>
+      <a:effectRef idx="0">
+        <a:scrgbClr r="0" g="0" b="0"/>
+      </a:effectRef>
+      <a:fontRef idx="minor"/>
+    </dgm:style>
+  </dgm:styleLbl>
+  <dgm:styleLbl name="callout">
+    <dgm:scene3d>
+      <a:camera prst="orthographicFront"/>
+      <a:lightRig rig="threePt" dir="t"/>
+    </dgm:scene3d>
+    <dgm:sp3d z="127000" prstMaterial="matte"/>
+    <dgm:txPr/>
+    <dgm:style>
+      <a:lnRef idx="2">
+        <a:scrgbClr r="0" g="0" b="0"/>
+      </a:lnRef>
+      <a:fillRef idx="1">
+        <a:scrgbClr r="0" g="0" b="0"/>
+      </a:fillRef>
+      <a:effectRef idx="0">
+        <a:scrgbClr r="0" g="0" b="0"/>
+      </a:effectRef>
+      <a:fontRef idx="minor"/>
+    </dgm:style>
+  </dgm:styleLbl>
+  <dgm:styleLbl name="asst0">
+    <dgm:scene3d>
+      <a:camera prst="orthographicFront"/>
+      <a:lightRig rig="threePt" dir="t"/>
+    </dgm:scene3d>
+    <dgm:sp3d extrusionH="381000" contourW="38100" prstMaterial="matte">
+      <a:contourClr>
+        <a:schemeClr val="lt1"/>
+      </a:contourClr>
+    </dgm:sp3d>
+    <dgm:txPr/>
+    <dgm:style>
+      <a:lnRef idx="0">
+        <a:scrgbClr r="0" g="0" b="0"/>
+      </a:lnRef>
+      <a:fillRef idx="1">
+        <a:scrgbClr r="0" g="0" b="0"/>
+      </a:fillRef>
+      <a:effectRef idx="0">
+        <a:scrgbClr r="0" g="0" b="0"/>
+      </a:effectRef>
+      <a:fontRef idx="minor">
+        <a:schemeClr val="lt1"/>
+      </a:fontRef>
+    </dgm:style>
+  </dgm:styleLbl>
+  <dgm:styleLbl name="asst1">
+    <dgm:scene3d>
+      <a:camera prst="orthographicFront"/>
+      <a:lightRig rig="threePt" dir="t"/>
+    </dgm:scene3d>
+    <dgm:sp3d extrusionH="381000" contourW="38100" prstMaterial="matte">
+      <a:contourClr>
+        <a:schemeClr val="lt1"/>
+      </a:contourClr>
+    </dgm:sp3d>
+    <dgm:txPr/>
+    <dgm:style>
+      <a:lnRef idx="0">
+        <a:scrgbClr r="0" g="0" b="0"/>
+      </a:lnRef>
+      <a:fillRef idx="1">
+        <a:scrgbClr r="0" g="0" b="0"/>
+      </a:fillRef>
+      <a:effectRef idx="0">
+        <a:scrgbClr r="0" g="0" b="0"/>
+      </a:effectRef>
+      <a:fontRef idx="minor">
+        <a:schemeClr val="lt1"/>
+      </a:fontRef>
+    </dgm:style>
+  </dgm:styleLbl>
+  <dgm:styleLbl name="asst2">
+    <dgm:scene3d>
+      <a:camera prst="orthographicFront"/>
+      <a:lightRig rig="threePt" dir="t"/>
+    </dgm:scene3d>
+    <dgm:sp3d extrusionH="381000" contourW="38100" prstMaterial="matte">
+      <a:contourClr>
+        <a:schemeClr val="lt1"/>
+      </a:contourClr>
+    </dgm:sp3d>
+    <dgm:txPr/>
+    <dgm:style>
+      <a:lnRef idx="0">
+        <a:scrgbClr r="0" g="0" b="0"/>
+      </a:lnRef>
+      <a:fillRef idx="1">
+        <a:scrgbClr r="0" g="0" b="0"/>
+      </a:fillRef>
+      <a:effectRef idx="0">
+        <a:scrgbClr r="0" g="0" b="0"/>
+      </a:effectRef>
+      <a:fontRef idx="minor">
+        <a:schemeClr val="lt1"/>
+      </a:fontRef>
+    </dgm:style>
+  </dgm:styleLbl>
+  <dgm:styleLbl name="asst3">
+    <dgm:scene3d>
+      <a:camera prst="orthographicFront"/>
+      <a:lightRig rig="threePt" dir="t"/>
+    </dgm:scene3d>
+    <dgm:sp3d extrusionH="381000" contourW="38100" prstMaterial="matte">
+      <a:contourClr>
+        <a:schemeClr val="lt1"/>
+      </a:contourClr>
+    </dgm:sp3d>
+    <dgm:txPr/>
+    <dgm:style>
+      <a:lnRef idx="0">
+        <a:scrgbClr r="0" g="0" b="0"/>
+      </a:lnRef>
+      <a:fillRef idx="1">
+        <a:scrgbClr r="0" g="0" b="0"/>
+      </a:fillRef>
+      <a:effectRef idx="0">
+        <a:scrgbClr r="0" g="0" b="0"/>
+      </a:effectRef>
+      <a:fontRef idx="minor">
+        <a:schemeClr val="lt1"/>
+      </a:fontRef>
+    </dgm:style>
+  </dgm:styleLbl>
+  <dgm:styleLbl name="parChTrans2D1">
+    <dgm:scene3d>
+      <a:camera prst="orthographicFront"/>
+      <a:lightRig rig="threePt" dir="t"/>
+    </dgm:scene3d>
+    <dgm:sp3d z="52400" extrusionH="381000" contourW="38100" prstMaterial="matte">
+      <a:contourClr>
+        <a:schemeClr val="lt1"/>
+      </a:contourClr>
+    </dgm:sp3d>
+    <dgm:txPr/>
+    <dgm:style>
+      <a:lnRef idx="0">
+        <a:scrgbClr r="0" g="0" b="0"/>
+      </a:lnRef>
+      <a:fillRef idx="1">
+        <a:scrgbClr r="0" g="0" b="0"/>
+      </a:fillRef>
+      <a:effectRef idx="0">
+        <a:scrgbClr r="0" g="0" b="0"/>
+      </a:effectRef>
+      <a:fontRef idx="minor">
+        <a:schemeClr val="lt1"/>
+      </a:fontRef>
+    </dgm:style>
+  </dgm:styleLbl>
+  <dgm:styleLbl name="parChTrans2D2">
+    <dgm:scene3d>
+      <a:camera prst="orthographicFront"/>
+      <a:lightRig rig="threePt" dir="t"/>
+    </dgm:scene3d>
+    <dgm:sp3d z="52400" extrusionH="381000" contourW="38100" prstMaterial="matte">
+      <a:contourClr>
+        <a:schemeClr val="lt1"/>
+      </a:contourClr>
+    </dgm:sp3d>
+    <dgm:txPr/>
+    <dgm:style>
+      <a:lnRef idx="0">
+        <a:scrgbClr r="0" g="0" b="0"/>
+      </a:lnRef>
+      <a:fillRef idx="1">
+        <a:scrgbClr r="0" g="0" b="0"/>
+      </a:fillRef>
+      <a:effectRef idx="0">
+        <a:scrgbClr r="0" g="0" b="0"/>
+      </a:effectRef>
+      <a:fontRef idx="minor">
+        <a:schemeClr val="lt1"/>
+      </a:fontRef>
+    </dgm:style>
+  </dgm:styleLbl>
+  <dgm:styleLbl name="parChTrans2D3">
+    <dgm:scene3d>
+      <a:camera prst="orthographicFront"/>
+      <a:lightRig rig="threePt" dir="t"/>
+    </dgm:scene3d>
+    <dgm:sp3d z="60000" prstMaterial="flat">
+      <a:bevelT w="120900" h="88900"/>
+      <a:bevelB w="88900" h="31750" prst="angle"/>
+    </dgm:sp3d>
+    <dgm:txPr/>
+    <dgm:style>
+      <a:lnRef idx="0">
+        <a:scrgbClr r="0" g="0" b="0"/>
+      </a:lnRef>
+      <a:fillRef idx="3">
+        <a:scrgbClr r="0" g="0" b="0"/>
+      </a:fillRef>
+      <a:effectRef idx="1">
+        <a:scrgbClr r="0" g="0" b="0"/>
+      </a:effectRef>
+      <a:fontRef idx="minor">
+        <a:schemeClr val="lt1"/>
+      </a:fontRef>
+    </dgm:style>
+  </dgm:styleLbl>
+  <dgm:styleLbl name="parChTrans2D4">
+    <dgm:scene3d>
+      <a:camera prst="orthographicFront"/>
+      <a:lightRig rig="threePt" dir="t"/>
+    </dgm:scene3d>
+    <dgm:sp3d z="60000" prstMaterial="flat">
+      <a:bevelT w="120900" h="88900"/>
+      <a:bevelB w="88900" h="31750" prst="angle"/>
+    </dgm:sp3d>
+    <dgm:txPr/>
+    <dgm:style>
+      <a:lnRef idx="0">
+        <a:scrgbClr r="0" g="0" b="0"/>
+      </a:lnRef>
+      <a:fillRef idx="3">
+        <a:scrgbClr r="0" g="0" b="0"/>
+      </a:fillRef>
+      <a:effectRef idx="1">
+        <a:scrgbClr r="0" g="0" b="0"/>
+      </a:effectRef>
+      <a:fontRef idx="minor">
+        <a:schemeClr val="lt1"/>
+      </a:fontRef>
+    </dgm:style>
+  </dgm:styleLbl>
+  <dgm:styleLbl name="parChTrans1D1">
+    <dgm:scene3d>
+      <a:camera prst="orthographicFront"/>
+      <a:lightRig rig="threePt" dir="t"/>
+    </dgm:scene3d>
+    <dgm:sp3d z="-40000" prstMaterial="matte"/>
+    <dgm:txPr/>
+    <dgm:style>
+      <a:lnRef idx="2">
+        <a:scrgbClr r="0" g="0" b="0"/>
+      </a:lnRef>
+      <a:fillRef idx="0">
+        <a:scrgbClr r="0" g="0" b="0"/>
+      </a:fillRef>
+      <a:effectRef idx="0">
+        <a:scrgbClr r="0" g="0" b="0"/>
+      </a:effectRef>
+      <a:fontRef idx="minor"/>
+    </dgm:style>
+  </dgm:styleLbl>
+  <dgm:styleLbl name="parChTrans1D2">
+    <dgm:scene3d>
+      <a:camera prst="orthographicFront"/>
+      <a:lightRig rig="threePt" dir="t"/>
+    </dgm:scene3d>
+    <dgm:sp3d z="-40000" prstMaterial="matte"/>
+    <dgm:txPr/>
+    <dgm:style>
+      <a:lnRef idx="2">
+        <a:scrgbClr r="0" g="0" b="0"/>
+      </a:lnRef>
+      <a:fillRef idx="0">
+        <a:scrgbClr r="0" g="0" b="0"/>
+      </a:fillRef>
+      <a:effectRef idx="0">
+        <a:scrgbClr r="0" g="0" b="0"/>
+      </a:effectRef>
+      <a:fontRef idx="minor"/>
+    </dgm:style>
+  </dgm:styleLbl>
+  <dgm:styleLbl name="parChTrans1D3">
+    <dgm:scene3d>
+      <a:camera prst="orthographicFront"/>
+      <a:lightRig rig="threePt" dir="t"/>
+    </dgm:scene3d>
+    <dgm:sp3d z="-40000" prstMaterial="matte"/>
+    <dgm:txPr/>
+    <dgm:style>
+      <a:lnRef idx="2">
+        <a:scrgbClr r="0" g="0" b="0"/>
+      </a:lnRef>
+      <a:fillRef idx="0">
+        <a:scrgbClr r="0" g="0" b="0"/>
+      </a:fillRef>
+      <a:effectRef idx="0">
+        <a:scrgbClr r="0" g="0" b="0"/>
+      </a:effectRef>
+      <a:fontRef idx="minor"/>
+    </dgm:style>
+  </dgm:styleLbl>
+  <dgm:styleLbl name="parChTrans1D4">
+    <dgm:scene3d>
+      <a:camera prst="orthographicFront"/>
+      <a:lightRig rig="threePt" dir="t"/>
+    </dgm:scene3d>
+    <dgm:sp3d z="-40000" prstMaterial="matte"/>
+    <dgm:txPr/>
+    <dgm:style>
+      <a:lnRef idx="2">
+        <a:scrgbClr r="0" g="0" b="0"/>
+      </a:lnRef>
+      <a:fillRef idx="0">
+        <a:scrgbClr r="0" g="0" b="0"/>
+      </a:fillRef>
+      <a:effectRef idx="0">
+        <a:scrgbClr r="0" g="0" b="0"/>
+      </a:effectRef>
+      <a:fontRef idx="minor"/>
+    </dgm:style>
+  </dgm:styleLbl>
+  <dgm:styleLbl name="fgAcc1">
+    <dgm:scene3d>
+      <a:camera prst="orthographicFront"/>
+      <a:lightRig rig="threePt" dir="t"/>
+    </dgm:scene3d>
+    <dgm:sp3d z="57150" extrusionH="63500" prstMaterial="matte"/>
+    <dgm:txPr/>
+    <dgm:style>
+      <a:lnRef idx="1">
+        <a:scrgbClr r="0" g="0" b="0"/>
+      </a:lnRef>
+      <a:fillRef idx="1">
+        <a:scrgbClr r="0" g="0" b="0"/>
+      </a:fillRef>
+      <a:effectRef idx="0">
+        <a:scrgbClr r="0" g="0" b="0"/>
+      </a:effectRef>
+      <a:fontRef idx="minor"/>
+    </dgm:style>
+  </dgm:styleLbl>
+  <dgm:styleLbl name="conFgAcc1">
+    <dgm:scene3d>
+      <a:camera prst="orthographicFront"/>
+      <a:lightRig rig="threePt" dir="t"/>
+    </dgm:scene3d>
+    <dgm:sp3d z="-60000" extrusionH="63500" prstMaterial="matte"/>
+    <dgm:txPr/>
+    <dgm:style>
+      <a:lnRef idx="1">
+        <a:scrgbClr r="0" g="0" b="0"/>
+      </a:lnRef>
+      <a:fillRef idx="1">
+        <a:scrgbClr r="0" g="0" b="0"/>
+      </a:fillRef>
+      <a:effectRef idx="0">
+        <a:scrgbClr r="0" g="0" b="0"/>
+      </a:effectRef>
+      <a:fontRef idx="minor"/>
+    </dgm:style>
+  </dgm:styleLbl>
+  <dgm:styleLbl name="alignAcc1">
+    <dgm:scene3d>
+      <a:camera prst="orthographicFront"/>
+      <a:lightRig rig="threePt" dir="t"/>
+    </dgm:scene3d>
+    <dgm:sp3d z="-60000" extrusionH="63500" prstMaterial="matte"/>
+    <dgm:txPr/>
+    <dgm:style>
+      <a:lnRef idx="1">
+        <a:scrgbClr r="0" g="0" b="0"/>
+      </a:lnRef>
+      <a:fillRef idx="1">
+        <a:scrgbClr r="0" g="0" b="0"/>
+      </a:fillRef>
+      <a:effectRef idx="0">
+        <a:scrgbClr r="0" g="0" b="0"/>
+      </a:effectRef>
+      <a:fontRef idx="minor"/>
+    </dgm:style>
+  </dgm:styleLbl>
+  <dgm:styleLbl name="trAlignAcc1">
+    <dgm:scene3d>
+      <a:camera prst="orthographicFront"/>
+      <a:lightRig rig="threePt" dir="t"/>
+    </dgm:scene3d>
+    <dgm:sp3d extrusionH="381000" prstMaterial="matte"/>
+    <dgm:txPr/>
+    <dgm:style>
+      <a:lnRef idx="1">
+        <a:scrgbClr r="0" g="0" b="0"/>
+      </a:lnRef>
+      <a:fillRef idx="1">
+        <a:scrgbClr r="0" g="0" b="0"/>
+      </a:fillRef>
+      <a:effectRef idx="0">
+        <a:scrgbClr r="0" g="0" b="0"/>
+      </a:effectRef>
+      <a:fontRef idx="minor"/>
+    </dgm:style>
+  </dgm:styleLbl>
+  <dgm:styleLbl name="bgAcc1">
+    <dgm:scene3d>
+      <a:camera prst="orthographicFront"/>
+      <a:lightRig rig="threePt" dir="t"/>
+    </dgm:scene3d>
+    <dgm:sp3d z="-400500" extrusionH="63500" prstMaterial="matte"/>
+    <dgm:txPr/>
+    <dgm:style>
+      <a:lnRef idx="1">
+        <a:scrgbClr r="0" g="0" b="0"/>
+      </a:lnRef>
+      <a:fillRef idx="1">
+        <a:scrgbClr r="0" g="0" b="0"/>
+      </a:fillRef>
+      <a:effectRef idx="0">
+        <a:scrgbClr r="0" g="0" b="0"/>
+      </a:effectRef>
+      <a:fontRef idx="minor"/>
+    </dgm:style>
+  </dgm:styleLbl>
+  <dgm:styleLbl name="solidFgAcc1">
+    <dgm:scene3d>
+      <a:camera prst="orthographicFront"/>
+      <a:lightRig rig="threePt" dir="t"/>
+    </dgm:scene3d>
+    <dgm:sp3d z="57150" extrusionH="12700" prstMaterial="flat">
+      <a:bevelT w="50800" h="50800"/>
+    </dgm:sp3d>
+    <dgm:txPr/>
+    <dgm:style>
+      <a:lnRef idx="1">
+        <a:scrgbClr r="0" g="0" b="0"/>
+      </a:lnRef>
+      <a:fillRef idx="1">
+        <a:scrgbClr r="0" g="0" b="0"/>
+      </a:fillRef>
+      <a:effectRef idx="2">
+        <a:scrgbClr r="0" g="0" b="0"/>
+      </a:effectRef>
+      <a:fontRef idx="minor"/>
+    </dgm:style>
+  </dgm:styleLbl>
+  <dgm:styleLbl name="solidAlignAcc1">
+    <dgm:scene3d>
+      <a:camera prst="orthographicFront"/>
+      <a:lightRig rig="threePt" dir="t"/>
+    </dgm:scene3d>
+    <dgm:sp3d extrusionH="12700" prstMaterial="flat">
+      <a:bevelT w="50800" h="50800"/>
+    </dgm:sp3d>
+    <dgm:txPr/>
+    <dgm:style>
+      <a:lnRef idx="1">
+        <a:scrgbClr r="0" g="0" b="0"/>
+      </a:lnRef>
+      <a:fillRef idx="1">
+        <a:scrgbClr r="0" g="0" b="0"/>
+      </a:fillRef>
+      <a:effectRef idx="2">
+        <a:scrgbClr r="0" g="0" b="0"/>
+      </a:effectRef>
+      <a:fontRef idx="minor"/>
+    </dgm:style>
+  </dgm:styleLbl>
+  <dgm:styleLbl name="solidBgAcc1">
+    <dgm:scene3d>
+      <a:camera prst="orthographicFront"/>
+      <a:lightRig rig="threePt" dir="t"/>
+    </dgm:scene3d>
+    <dgm:sp3d z="-63500" extrusionH="63500" prstMaterial="matte"/>
+    <dgm:txPr/>
+    <dgm:style>
+      <a:lnRef idx="1">
+        <a:scrgbClr r="0" g="0" b="0"/>
+      </a:lnRef>
+      <a:fillRef idx="1">
+        <a:scrgbClr r="0" g="0" b="0"/>
+      </a:fillRef>
+      <a:effectRef idx="0">
+        <a:scrgbClr r="0" g="0" b="0"/>
+      </a:effectRef>
+      <a:fontRef idx="minor"/>
+    </dgm:style>
+  </dgm:styleLbl>
+  <dgm:styleLbl name="fgAccFollowNode1">
+    <dgm:scene3d>
+      <a:camera prst="orthographicFront"/>
+      <a:lightRig rig="threePt" dir="t"/>
+    </dgm:scene3d>
+    <dgm:sp3d z="57150" extrusionH="63500" contourW="12700" prstMaterial="matte">
+      <a:contourClr>
+        <a:schemeClr val="dk1">
+          <a:tint val="20000"/>
+        </a:schemeClr>
+      </a:contourClr>
+    </dgm:sp3d>
+    <dgm:txPr/>
+    <dgm:style>
+      <a:lnRef idx="0">
+        <a:scrgbClr r="0" g="0" b="0"/>
+      </a:lnRef>
+      <a:fillRef idx="1">
+        <a:scrgbClr r="0" g="0" b="0"/>
+      </a:fillRef>
+      <a:effectRef idx="0">
+        <a:scrgbClr r="0" g="0" b="0"/>
+      </a:effectRef>
+      <a:fontRef idx="minor"/>
+    </dgm:style>
+  </dgm:styleLbl>
+  <dgm:styleLbl name="alignAccFollowNode1">
+    <dgm:scene3d>
+      <a:camera prst="orthographicFront"/>
+      <a:lightRig rig="threePt" dir="t"/>
+    </dgm:scene3d>
+    <dgm:sp3d extrusionH="381000" contourW="38100" prstMaterial="matte">
+      <a:contourClr>
+        <a:schemeClr val="lt1"/>
+      </a:contourClr>
+    </dgm:sp3d>
+    <dgm:txPr/>
+    <dgm:style>
+      <a:lnRef idx="0">
+        <a:scrgbClr r="0" g="0" b="0"/>
+      </a:lnRef>
+      <a:fillRef idx="1">
+        <a:scrgbClr r="0" g="0" b="0"/>
+      </a:fillRef>
+      <a:effectRef idx="0">
+        <a:scrgbClr r="0" g="0" b="0"/>
+      </a:effectRef>
+      <a:fontRef idx="minor"/>
+    </dgm:style>
+  </dgm:styleLbl>
+  <dgm:styleLbl name="bgAccFollowNode1">
+    <dgm:scene3d>
+      <a:camera prst="orthographicFront"/>
+      <a:lightRig rig="threePt" dir="t"/>
+    </dgm:scene3d>
+    <dgm:sp3d z="-400500" extrusionH="63500" contourW="12700" prstMaterial="matte">
+      <a:contourClr>
+        <a:schemeClr val="lt1"/>
+      </a:contourClr>
+    </dgm:sp3d>
+    <dgm:txPr/>
+    <dgm:style>
+      <a:lnRef idx="0">
+        <a:scrgbClr r="0" g="0" b="0"/>
+      </a:lnRef>
+      <a:fillRef idx="1">
+        <a:scrgbClr r="0" g="0" b="0"/>
+      </a:fillRef>
+      <a:effectRef idx="2">
+        <a:scrgbClr r="0" g="0" b="0"/>
+      </a:effectRef>
+      <a:fontRef idx="minor"/>
+    </dgm:style>
+  </dgm:styleLbl>
+  <dgm:styleLbl name="fgAcc0">
+    <dgm:scene3d>
+      <a:camera prst="orthographicFront"/>
+      <a:lightRig rig="threePt" dir="t"/>
+    </dgm:scene3d>
+    <dgm:sp3d z="57150" extrusionH="63500" prstMaterial="matte"/>
+    <dgm:txPr/>
+    <dgm:style>
+      <a:lnRef idx="1">
+        <a:scrgbClr r="0" g="0" b="0"/>
+      </a:lnRef>
+      <a:fillRef idx="1">
+        <a:scrgbClr r="0" g="0" b="0"/>
+      </a:fillRef>
+      <a:effectRef idx="0">
+        <a:scrgbClr r="0" g="0" b="0"/>
+      </a:effectRef>
+      <a:fontRef idx="minor"/>
+    </dgm:style>
+  </dgm:styleLbl>
+  <dgm:styleLbl name="fgAcc2">
+    <dgm:scene3d>
+      <a:camera prst="orthographicFront"/>
+      <a:lightRig rig="threePt" dir="t"/>
+    </dgm:scene3d>
+    <dgm:sp3d z="57150" extrusionH="63500" prstMaterial="matte"/>
+    <dgm:txPr/>
+    <dgm:style>
+      <a:lnRef idx="1">
+        <a:scrgbClr r="0" g="0" b="0"/>
+      </a:lnRef>
+      <a:fillRef idx="1">
+        <a:scrgbClr r="0" g="0" b="0"/>
+      </a:fillRef>
+      <a:effectRef idx="0">
+        <a:scrgbClr r="0" g="0" b="0"/>
+      </a:effectRef>
+      <a:fontRef idx="minor"/>
+    </dgm:style>
+  </dgm:styleLbl>
+  <dgm:styleLbl name="fgAcc3">
+    <dgm:scene3d>
+      <a:camera prst="orthographicFront"/>
+      <a:lightRig rig="threePt" dir="t"/>
+    </dgm:scene3d>
+    <dgm:sp3d z="57150" extrusionH="63500" prstMaterial="matte"/>
+    <dgm:txPr/>
+    <dgm:style>
+      <a:lnRef idx="1">
+        <a:scrgbClr r="0" g="0" b="0"/>
+      </a:lnRef>
+      <a:fillRef idx="1">
+        <a:scrgbClr r="0" g="0" b="0"/>
+      </a:fillRef>
+      <a:effectRef idx="0">
+        <a:scrgbClr r="0" g="0" b="0"/>
+      </a:effectRef>
+      <a:fontRef idx="minor"/>
+    </dgm:style>
+  </dgm:styleLbl>
+  <dgm:styleLbl name="fgAcc4">
+    <dgm:scene3d>
+      <a:camera prst="orthographicFront"/>
+      <a:lightRig rig="threePt" dir="t"/>
+    </dgm:scene3d>
+    <dgm:sp3d z="57150" extrusionH="63500" prstMaterial="matte"/>
+    <dgm:txPr/>
+    <dgm:style>
+      <a:lnRef idx="1">
+        <a:scrgbClr r="0" g="0" b="0"/>
+      </a:lnRef>
+      <a:fillRef idx="1">
+        <a:scrgbClr r="0" g="0" b="0"/>
+      </a:fillRef>
+      <a:effectRef idx="0">
+        <a:scrgbClr r="0" g="0" b="0"/>
+      </a:effectRef>
+      <a:fontRef idx="minor"/>
+    </dgm:style>
+  </dgm:styleLbl>
+  <dgm:styleLbl name="bgShp">
+    <dgm:scene3d>
+      <a:camera prst="orthographicFront"/>
+      <a:lightRig rig="threePt" dir="t"/>
+    </dgm:scene3d>
+    <dgm:sp3d z="-400500" extrusionH="63500" contourW="12700" prstMaterial="matte">
+      <a:contourClr>
+        <a:schemeClr val="lt1">
+          <a:tint val="50000"/>
+        </a:schemeClr>
+      </a:contourClr>
+    </dgm:sp3d>
+    <dgm:txPr/>
+    <dgm:style>
+      <a:lnRef idx="0">
+        <a:scrgbClr r="0" g="0" b="0"/>
+      </a:lnRef>
+      <a:fillRef idx="1">
+        <a:scrgbClr r="0" g="0" b="0"/>
+      </a:fillRef>
+      <a:effectRef idx="0">
+        <a:scrgbClr r="0" g="0" b="0"/>
+      </a:effectRef>
+      <a:fontRef idx="minor"/>
+    </dgm:style>
+  </dgm:styleLbl>
+  <dgm:styleLbl name="dkBgShp">
+    <dgm:scene3d>
+      <a:camera prst="orthographicFront"/>
+      <a:lightRig rig="threePt" dir="t"/>
+    </dgm:scene3d>
+    <dgm:sp3d extrusionH="381000" contourW="38100" prstMaterial="matte">
+      <a:contourClr>
+        <a:schemeClr val="lt1"/>
+      </a:contourClr>
+    </dgm:sp3d>
+    <dgm:txPr/>
+    <dgm:style>
+      <a:lnRef idx="0">
+        <a:scrgbClr r="0" g="0" b="0"/>
+      </a:lnRef>
+      <a:fillRef idx="1">
+        <a:scrgbClr r="0" g="0" b="0"/>
+      </a:fillRef>
+      <a:effectRef idx="0">
+        <a:scrgbClr r="0" g="0" b="0"/>
+      </a:effectRef>
+      <a:fontRef idx="minor">
+        <a:schemeClr val="lt1"/>
+      </a:fontRef>
+    </dgm:style>
+  </dgm:styleLbl>
+  <dgm:styleLbl name="trBgShp">
+    <dgm:scene3d>
+      <a:camera prst="orthographicFront"/>
+      <a:lightRig rig="threePt" dir="t"/>
+    </dgm:scene3d>
+    <dgm:sp3d z="-400500" prstMaterial="matte"/>
+    <dgm:txPr/>
+    <dgm:style>
+      <a:lnRef idx="0">
+        <a:scrgbClr r="0" g="0" b="0"/>
+      </a:lnRef>
+      <a:fillRef idx="1">
+        <a:scrgbClr r="0" g="0" b="0"/>
+      </a:fillRef>
+      <a:effectRef idx="0">
+        <a:scrgbClr r="0" g="0" b="0"/>
+      </a:effectRef>
+      <a:fontRef idx="minor"/>
+    </dgm:style>
+  </dgm:styleLbl>
+  <dgm:styleLbl name="fgShp">
+    <dgm:scene3d>
+      <a:camera prst="orthographicFront"/>
+      <a:lightRig rig="threePt" dir="t"/>
+    </dgm:scene3d>
+    <dgm:sp3d z="57150" extrusionH="63500" contourW="12700" prstMaterial="matte">
+      <a:contourClr>
+        <a:schemeClr val="lt1">
+          <a:tint val="50000"/>
+        </a:schemeClr>
+      </a:contourClr>
+    </dgm:sp3d>
+    <dgm:txPr/>
+    <dgm:style>
+      <a:lnRef idx="0">
+        <a:scrgbClr r="0" g="0" b="0"/>
+      </a:lnRef>
+      <a:fillRef idx="1">
+        <a:scrgbClr r="0" g="0" b="0"/>
+      </a:fillRef>
+      <a:effectRef idx="0">
+        <a:scrgbClr r="0" g="0" b="0"/>
+      </a:effectRef>
+      <a:fontRef idx="minor"/>
+    </dgm:style>
+  </dgm:styleLbl>
+  <dgm:styleLbl name="revTx">
+    <dgm:scene3d>
+      <a:camera prst="orthographicFront"/>
+      <a:lightRig rig="threePt" dir="t"/>
+    </dgm:scene3d>
+    <dgm:sp3d/>
+    <dgm:txPr/>
+    <dgm:style>
+      <a:lnRef idx="0">
+        <a:scrgbClr r="0" g="0" b="0"/>
+      </a:lnRef>
+      <a:fillRef idx="0">
+        <a:scrgbClr r="0" g="0" b="0"/>
+      </a:fillRef>
+      <a:effectRef idx="0">
+        <a:scrgbClr r="0" g="0" b="0"/>
+      </a:effectRef>
+      <a:fontRef idx="minor"/>
+    </dgm:style>
+  </dgm:styleLbl>
+</dgm:styleDef>
 </file>
 
 <file path=ppt/slideLayouts/slideLayout1.xml><?xml version="1.0" encoding="utf-8"?>
@@ -5886,14 +8520,14 @@
           <a:lstStyle/>
           <a:p>
             <a:r>
-              <a:rPr lang="en-US" sz="4400" dirty="0" smtClean="0">
+              <a:rPr lang="en-US" sz="4800" dirty="0" smtClean="0">
                 <a:solidFill>
                   <a:schemeClr val="tx1"/>
                 </a:solidFill>
               </a:rPr>
               <a:t>Ben Church</a:t>
             </a:r>
-            <a:endParaRPr lang="en-CA" sz="2800" dirty="0">
+            <a:endParaRPr lang="en-CA" sz="3200" dirty="0">
               <a:solidFill>
                 <a:schemeClr val="tx1"/>
               </a:solidFill>
@@ -5997,15 +8631,7 @@
                   <a:schemeClr val="tx1"/>
                 </a:solidFill>
               </a:rPr>
-              <a:t>Crisp mobile robot </a:t>
-            </a:r>
-            <a:r>
-              <a:rPr lang="en-US" sz="3600" dirty="0" smtClean="0">
-                <a:solidFill>
-                  <a:schemeClr val="tx1"/>
-                </a:solidFill>
-              </a:rPr>
-              <a:t>navigation</a:t>
+              <a:t>Crisp mobile robot navigation</a:t>
             </a:r>
           </a:p>
           <a:p>
@@ -6149,6 +8775,73 @@
       </p:grpSpPr>
       <p:sp>
         <p:nvSpPr>
+          <p:cNvPr id="5" name="Title 1"/>
+          <p:cNvSpPr>
+            <a:spLocks noGrp="1"/>
+          </p:cNvSpPr>
+          <p:nvPr>
+            <p:ph type="ctrTitle"/>
+          </p:nvPr>
+        </p:nvSpPr>
+        <p:spPr>
+          <a:xfrm>
+            <a:off x="418012" y="2404534"/>
+            <a:ext cx="8855992" cy="1646302"/>
+          </a:xfrm>
+        </p:spPr>
+        <p:txBody>
+          <a:bodyPr>
+            <a:noAutofit/>
+          </a:bodyPr>
+          <a:lstStyle/>
+          <a:p>
+            <a:r>
+              <a:rPr lang="en-US" sz="6600" dirty="0" smtClean="0"/>
+              <a:t>Crisp mobile </a:t>
+            </a:r>
+            <a:br>
+              <a:rPr lang="en-US" sz="6600" dirty="0" smtClean="0"/>
+            </a:br>
+            <a:r>
+              <a:rPr lang="en-US" sz="6600" dirty="0" smtClean="0"/>
+              <a:t>robot navigation</a:t>
+            </a:r>
+            <a:endParaRPr lang="en-CA" sz="6600" dirty="0"/>
+          </a:p>
+        </p:txBody>
+      </p:sp>
+    </p:spTree>
+    <p:extLst>
+      <p:ext uri="{BB962C8B-B14F-4D97-AF65-F5344CB8AC3E}">
+        <p14:creationId xmlns:p14="http://schemas.microsoft.com/office/powerpoint/2010/main" val="1373526618"/>
+      </p:ext>
+    </p:extLst>
+  </p:cSld>
+  <p:clrMapOvr>
+    <a:masterClrMapping/>
+  </p:clrMapOvr>
+</p:sld>
+</file>
+
+<file path=ppt/slides/slide4.xml><?xml version="1.0" encoding="utf-8"?>
+<p:sld xmlns:a="http://schemas.openxmlformats.org/drawingml/2006/main" xmlns:r="http://schemas.openxmlformats.org/officeDocument/2006/relationships" xmlns:p="http://schemas.openxmlformats.org/presentationml/2006/main">
+  <p:cSld>
+    <p:spTree>
+      <p:nvGrpSpPr>
+        <p:cNvPr id="1" name=""/>
+        <p:cNvGrpSpPr/>
+        <p:nvPr/>
+      </p:nvGrpSpPr>
+      <p:grpSpPr>
+        <a:xfrm>
+          <a:off x="0" y="0"/>
+          <a:ext cx="0" cy="0"/>
+          <a:chOff x="0" y="0"/>
+          <a:chExt cx="0" cy="0"/>
+        </a:xfrm>
+      </p:grpSpPr>
+      <p:sp>
+        <p:nvSpPr>
           <p:cNvPr id="2" name="Title 1"/>
           <p:cNvSpPr>
             <a:spLocks noGrp="1"/>
@@ -6169,7 +8862,7 @@
           <a:p>
             <a:r>
               <a:rPr lang="en-US" sz="6000" dirty="0" smtClean="0"/>
-              <a:t>Crisp navigation</a:t>
+              <a:t>Navigation analysis</a:t>
             </a:r>
             <a:endParaRPr lang="en-CA" dirty="0"/>
           </a:p>
@@ -6195,12 +8888,20 @@
           <a:bodyPr/>
           <a:lstStyle/>
           <a:p>
-            <a:pPr lvl="2">
+            <a:pPr>
               <a:buSzPct val="100000"/>
               <a:buFont typeface="Wingdings 3" panose="05040102010807070707" pitchFamily="18" charset="2"/>
               <a:buChar char=""/>
             </a:pPr>
-            <a:endParaRPr lang="en-US" sz="3200" dirty="0" smtClean="0">
+            <a:r>
+              <a:rPr lang="en-US" sz="3600" dirty="0" smtClean="0">
+                <a:solidFill>
+                  <a:schemeClr val="tx1"/>
+                </a:solidFill>
+              </a:rPr>
+              <a:t>System consists of environment and behavior</a:t>
+            </a:r>
+            <a:endParaRPr lang="en-US" sz="3600" dirty="0" smtClean="0">
               <a:solidFill>
                 <a:schemeClr val="tx1"/>
               </a:solidFill>
@@ -6212,6 +8913,126 @@
     <p:extLst>
       <p:ext uri="{BB962C8B-B14F-4D97-AF65-F5344CB8AC3E}">
         <p14:creationId xmlns:p14="http://schemas.microsoft.com/office/powerpoint/2010/main" val="4038541061"/>
+      </p:ext>
+    </p:extLst>
+  </p:cSld>
+  <p:clrMapOvr>
+    <a:masterClrMapping/>
+  </p:clrMapOvr>
+  <p:timing>
+    <p:tnLst>
+      <p:par>
+        <p:cTn id="1" dur="indefinite" restart="never" nodeType="tmRoot"/>
+      </p:par>
+    </p:tnLst>
+  </p:timing>
+</p:sld>
+</file>
+
+<file path=ppt/slides/slide5.xml><?xml version="1.0" encoding="utf-8"?>
+<p:sld xmlns:a="http://schemas.openxmlformats.org/drawingml/2006/main" xmlns:r="http://schemas.openxmlformats.org/officeDocument/2006/relationships" xmlns:p="http://schemas.openxmlformats.org/presentationml/2006/main">
+  <p:cSld>
+    <p:spTree>
+      <p:nvGrpSpPr>
+        <p:cNvPr id="1" name=""/>
+        <p:cNvGrpSpPr/>
+        <p:nvPr/>
+      </p:nvGrpSpPr>
+      <p:grpSpPr>
+        <a:xfrm>
+          <a:off x="0" y="0"/>
+          <a:ext cx="0" cy="0"/>
+          <a:chOff x="0" y="0"/>
+          <a:chExt cx="0" cy="0"/>
+        </a:xfrm>
+      </p:grpSpPr>
+      <p:sp>
+        <p:nvSpPr>
+          <p:cNvPr id="2" name="Title 1"/>
+          <p:cNvSpPr>
+            <a:spLocks noGrp="1"/>
+          </p:cNvSpPr>
+          <p:nvPr>
+            <p:ph type="title"/>
+          </p:nvPr>
+        </p:nvSpPr>
+        <p:spPr>
+          <a:xfrm>
+            <a:off x="677334" y="609600"/>
+            <a:ext cx="8596668" cy="1053737"/>
+          </a:xfrm>
+        </p:spPr>
+        <p:txBody>
+          <a:bodyPr/>
+          <a:lstStyle/>
+          <a:p>
+            <a:r>
+              <a:rPr lang="en-US" sz="6000" dirty="0" smtClean="0"/>
+              <a:t>Environment</a:t>
+            </a:r>
+            <a:endParaRPr lang="en-CA" dirty="0"/>
+          </a:p>
+        </p:txBody>
+      </p:sp>
+      <p:sp>
+        <p:nvSpPr>
+          <p:cNvPr id="3" name="Content Placeholder 2"/>
+          <p:cNvSpPr>
+            <a:spLocks noGrp="1"/>
+          </p:cNvSpPr>
+          <p:nvPr>
+            <p:ph sz="half" idx="1"/>
+          </p:nvPr>
+        </p:nvSpPr>
+        <p:spPr>
+          <a:xfrm>
+            <a:off x="677334" y="1663337"/>
+            <a:ext cx="4248893" cy="4378024"/>
+          </a:xfrm>
+        </p:spPr>
+        <p:txBody>
+          <a:bodyPr/>
+          <a:lstStyle/>
+          <a:p>
+            <a:pPr>
+              <a:buSzPct val="100000"/>
+              <a:buFont typeface="Wingdings 3" panose="05040102010807070707" pitchFamily="18" charset="2"/>
+              <a:buChar char=""/>
+            </a:pPr>
+            <a:endParaRPr lang="en-US" sz="3600" dirty="0" smtClean="0">
+              <a:solidFill>
+                <a:schemeClr val="tx1"/>
+              </a:solidFill>
+            </a:endParaRPr>
+          </a:p>
+        </p:txBody>
+      </p:sp>
+      <p:graphicFrame>
+        <p:nvGraphicFramePr>
+          <p:cNvPr id="4" name="Diagram 3"/>
+          <p:cNvGraphicFramePr/>
+          <p:nvPr>
+            <p:extLst>
+              <p:ext uri="{D42A27DB-BD31-4B8C-83A1-F6EECF244321}">
+                <p14:modId xmlns:p14="http://schemas.microsoft.com/office/powerpoint/2010/main" val="3282404253"/>
+              </p:ext>
+            </p:extLst>
+          </p:nvPr>
+        </p:nvGraphicFramePr>
+        <p:xfrm>
+          <a:off x="4975667" y="1762896"/>
+          <a:ext cx="4712029" cy="3632887"/>
+        </p:xfrm>
+        <a:graphic>
+          <a:graphicData uri="http://schemas.openxmlformats.org/drawingml/2006/diagram">
+            <dgm:relIds xmlns:dgm="http://schemas.openxmlformats.org/drawingml/2006/diagram" xmlns:r="http://schemas.openxmlformats.org/officeDocument/2006/relationships" r:dm="rId2" r:lo="rId3" r:qs="rId4" r:cs="rId5"/>
+          </a:graphicData>
+        </a:graphic>
+      </p:graphicFrame>
+    </p:spTree>
+    <p:extLst>
+      <p:ext uri="{BB962C8B-B14F-4D97-AF65-F5344CB8AC3E}">
+        <p14:creationId xmlns:p14="http://schemas.microsoft.com/office/powerpoint/2010/main" val="729360427"/>
       </p:ext>
     </p:extLst>
   </p:cSld>

</xml_diff>